<commit_message>
Cleaned up CGDA CS1 powerpoint
</commit_message>
<xml_diff>
--- a/downloads/2023-04-02-gda-cs1/CyclisticRiderTrends.pptx
+++ b/downloads/2023-04-02-gda-cs1/CyclisticRiderTrends.pptx
@@ -250,7 +250,7 @@
           <a:p>
             <a:fld id="{8CD26A2A-0A96-0647-84E5-C82F2EFD9474}" type="datetimeFigureOut">
               <a:rPr lang="en-US" smtClean="0"/>
-              <a:t>4/9/2023</a:t>
+              <a:t>4/10/2023</a:t>
             </a:fld>
             <a:endParaRPr lang="en-US" dirty="0"/>
           </a:p>
@@ -427,7 +427,7 @@
           <a:p>
             <a:fld id="{A2B40C3B-E28A-4854-8EDA-E7F8F6F6FFEF}" type="datetimeFigureOut">
               <a:rPr lang="zh-CN" altLang="en-US" smtClean="0"/>
-              <a:t>2023/4/9</a:t>
+              <a:t>2023/4/10</a:t>
             </a:fld>
             <a:endParaRPr lang="zh-CN" altLang="en-US"/>
           </a:p>
@@ -24904,9 +24904,10 @@
           <a:lstStyle/>
           <a:p>
             <a:r>
-              <a:rPr lang="en-US" dirty="0"/>
+              <a:rPr lang="en-US" dirty="0" err="1"/>
               <a:t>analusis.dev</a:t>
             </a:r>
+            <a:endParaRPr lang="en-US" dirty="0"/>
           </a:p>
         </p:txBody>
       </p:sp>
@@ -25438,217 +25439,6 @@
           </a:p>
         </p:txBody>
       </p:sp>
-      <p:sp>
-        <p:nvSpPr>
-          <p:cNvPr id="8" name="Slide Number Placeholder 13">
-            <a:extLst>
-              <a:ext uri="{FF2B5EF4-FFF2-40B4-BE49-F238E27FC236}">
-                <a16:creationId xmlns:a16="http://schemas.microsoft.com/office/drawing/2014/main" id="{CFA8B549-5835-0C7F-9027-5D0D38A50DEB}"/>
-              </a:ext>
-            </a:extLst>
-          </p:cNvPr>
-          <p:cNvSpPr txBox="1">
-            <a:spLocks/>
-          </p:cNvSpPr>
-          <p:nvPr/>
-        </p:nvSpPr>
-        <p:spPr>
-          <a:xfrm>
-            <a:off x="11194169" y="6215665"/>
-            <a:ext cx="458592" cy="365125"/>
-          </a:xfrm>
-          <a:prstGeom prst="rect">
-            <a:avLst/>
-          </a:prstGeom>
-        </p:spPr>
-        <p:txBody>
-          <a:bodyPr anchor="ctr"/>
-          <a:lstStyle>
-            <a:defPPr>
-              <a:defRPr lang="zh-CN"/>
-            </a:defPPr>
-            <a:lvl1pPr marL="0" algn="ctr" defTabSz="914400" rtl="0" eaLnBrk="1" latinLnBrk="0" hangingPunct="1">
-              <a:defRPr sz="1200" b="0" i="0" kern="1200">
-                <a:solidFill>
-                  <a:schemeClr val="tx1"/>
-                </a:solidFill>
-                <a:latin typeface="Abadi" panose="020B0604020104020204" pitchFamily="34" charset="0"/>
-                <a:ea typeface="+mn-ea"/>
-                <a:cs typeface="+mn-cs"/>
-              </a:defRPr>
-            </a:lvl1pPr>
-            <a:lvl2pPr marL="457200" algn="l" defTabSz="914400" rtl="0" eaLnBrk="1" latinLnBrk="0" hangingPunct="1">
-              <a:defRPr sz="1800" kern="1200">
-                <a:solidFill>
-                  <a:schemeClr val="tx1"/>
-                </a:solidFill>
-                <a:latin typeface="+mn-lt"/>
-                <a:ea typeface="+mn-ea"/>
-                <a:cs typeface="+mn-cs"/>
-              </a:defRPr>
-            </a:lvl2pPr>
-            <a:lvl3pPr marL="914400" algn="l" defTabSz="914400" rtl="0" eaLnBrk="1" latinLnBrk="0" hangingPunct="1">
-              <a:defRPr sz="1800" kern="1200">
-                <a:solidFill>
-                  <a:schemeClr val="tx1"/>
-                </a:solidFill>
-                <a:latin typeface="+mn-lt"/>
-                <a:ea typeface="+mn-ea"/>
-                <a:cs typeface="+mn-cs"/>
-              </a:defRPr>
-            </a:lvl3pPr>
-            <a:lvl4pPr marL="1371600" algn="l" defTabSz="914400" rtl="0" eaLnBrk="1" latinLnBrk="0" hangingPunct="1">
-              <a:defRPr sz="1800" kern="1200">
-                <a:solidFill>
-                  <a:schemeClr val="tx1"/>
-                </a:solidFill>
-                <a:latin typeface="+mn-lt"/>
-                <a:ea typeface="+mn-ea"/>
-                <a:cs typeface="+mn-cs"/>
-              </a:defRPr>
-            </a:lvl4pPr>
-            <a:lvl5pPr marL="1828800" algn="l" defTabSz="914400" rtl="0" eaLnBrk="1" latinLnBrk="0" hangingPunct="1">
-              <a:defRPr sz="1800" kern="1200">
-                <a:solidFill>
-                  <a:schemeClr val="tx1"/>
-                </a:solidFill>
-                <a:latin typeface="+mn-lt"/>
-                <a:ea typeface="+mn-ea"/>
-                <a:cs typeface="+mn-cs"/>
-              </a:defRPr>
-            </a:lvl5pPr>
-            <a:lvl6pPr marL="2286000" algn="l" defTabSz="914400" rtl="0" eaLnBrk="1" latinLnBrk="0" hangingPunct="1">
-              <a:defRPr sz="1800" kern="1200">
-                <a:solidFill>
-                  <a:schemeClr val="tx1"/>
-                </a:solidFill>
-                <a:latin typeface="+mn-lt"/>
-                <a:ea typeface="+mn-ea"/>
-                <a:cs typeface="+mn-cs"/>
-              </a:defRPr>
-            </a:lvl6pPr>
-            <a:lvl7pPr marL="2743200" algn="l" defTabSz="914400" rtl="0" eaLnBrk="1" latinLnBrk="0" hangingPunct="1">
-              <a:defRPr sz="1800" kern="1200">
-                <a:solidFill>
-                  <a:schemeClr val="tx1"/>
-                </a:solidFill>
-                <a:latin typeface="+mn-lt"/>
-                <a:ea typeface="+mn-ea"/>
-                <a:cs typeface="+mn-cs"/>
-              </a:defRPr>
-            </a:lvl7pPr>
-            <a:lvl8pPr marL="3200400" algn="l" defTabSz="914400" rtl="0" eaLnBrk="1" latinLnBrk="0" hangingPunct="1">
-              <a:defRPr sz="1800" kern="1200">
-                <a:solidFill>
-                  <a:schemeClr val="tx1"/>
-                </a:solidFill>
-                <a:latin typeface="+mn-lt"/>
-                <a:ea typeface="+mn-ea"/>
-                <a:cs typeface="+mn-cs"/>
-              </a:defRPr>
-            </a:lvl8pPr>
-            <a:lvl9pPr marL="3657600" algn="l" defTabSz="914400" rtl="0" eaLnBrk="1" latinLnBrk="0" hangingPunct="1">
-              <a:defRPr sz="1800" kern="1200">
-                <a:solidFill>
-                  <a:schemeClr val="tx1"/>
-                </a:solidFill>
-                <a:latin typeface="+mn-lt"/>
-                <a:ea typeface="+mn-ea"/>
-                <a:cs typeface="+mn-cs"/>
-              </a:defRPr>
-            </a:lvl9pPr>
-          </a:lstStyle>
-          <a:p>
-            <a:pPr marL="0" marR="0" lvl="0" indent="0" algn="ctr" defTabSz="914400" rtl="0" eaLnBrk="1" fontAlgn="auto" latinLnBrk="0" hangingPunct="1">
-              <a:lnSpc>
-                <a:spcPct val="100000"/>
-              </a:lnSpc>
-              <a:spcBef>
-                <a:spcPts val="0"/>
-              </a:spcBef>
-              <a:spcAft>
-                <a:spcPts val="0"/>
-              </a:spcAft>
-              <a:buClrTx/>
-              <a:buSzTx/>
-              <a:buFontTx/>
-              <a:buNone/>
-              <a:tabLst/>
-              <a:defRPr/>
-            </a:pPr>
-            <a:fld id="{47FEACEE-25B4-4A2D-B147-27296E36371D}" type="slidenum">
-              <a:rPr kumimoji="0" lang="zh-CN" altLang="en-US" sz="1200" u="none" strike="noStrike" kern="1200" cap="none" spc="0" normalizeH="0" baseline="0" noProof="0" smtClean="0">
-                <a:ln>
-                  <a:noFill/>
-                </a:ln>
-                <a:solidFill>
-                  <a:schemeClr val="bg1"/>
-                </a:solidFill>
-                <a:effectLst/>
-                <a:uLnTx/>
-                <a:uFillTx/>
-              </a:rPr>
-              <a:pPr marL="0" marR="0" lvl="0" indent="0" algn="ctr" defTabSz="914400" rtl="0" eaLnBrk="1" fontAlgn="auto" latinLnBrk="0" hangingPunct="1">
-                <a:lnSpc>
-                  <a:spcPct val="100000"/>
-                </a:lnSpc>
-                <a:spcBef>
-                  <a:spcPts val="0"/>
-                </a:spcBef>
-                <a:spcAft>
-                  <a:spcPts val="0"/>
-                </a:spcAft>
-                <a:buClrTx/>
-                <a:buSzTx/>
-                <a:buFontTx/>
-                <a:buNone/>
-                <a:tabLst/>
-                <a:defRPr/>
-              </a:pPr>
-              <a:t>10</a:t>
-            </a:fld>
-            <a:endParaRPr kumimoji="0" lang="zh-CN" altLang="en-US" sz="1200" u="none" strike="noStrike" kern="1200" cap="none" spc="0" normalizeH="0" baseline="0" noProof="0" dirty="0">
-              <a:ln>
-                <a:noFill/>
-              </a:ln>
-              <a:solidFill>
-                <a:schemeClr val="bg1"/>
-              </a:solidFill>
-              <a:effectLst/>
-              <a:uLnTx/>
-              <a:uFillTx/>
-            </a:endParaRPr>
-          </a:p>
-        </p:txBody>
-      </p:sp>
-      <p:sp>
-        <p:nvSpPr>
-          <p:cNvPr id="4" name="Footer Placeholder 3">
-            <a:extLst>
-              <a:ext uri="{FF2B5EF4-FFF2-40B4-BE49-F238E27FC236}">
-                <a16:creationId xmlns:a16="http://schemas.microsoft.com/office/drawing/2014/main" id="{15D16185-55D3-A290-727A-4996BB9F0A9F}"/>
-              </a:ext>
-            </a:extLst>
-          </p:cNvPr>
-          <p:cNvSpPr>
-            <a:spLocks noGrp="1"/>
-          </p:cNvSpPr>
-          <p:nvPr>
-            <p:ph type="ftr" sz="quarter" idx="28"/>
-          </p:nvPr>
-        </p:nvSpPr>
-        <p:spPr/>
-        <p:txBody>
-          <a:bodyPr/>
-          <a:lstStyle/>
-          <a:p>
-            <a:r>
-              <a:rPr lang="en-US" noProof="0" dirty="0"/>
-              <a:t>Cyclistic – Rider Trends</a:t>
-            </a:r>
-          </a:p>
-        </p:txBody>
-      </p:sp>
       <p:pic>
         <p:nvPicPr>
           <p:cNvPr id="3" name="Picture 2" descr="Chart, bar chart&#10;&#10;Description automatically generated">
@@ -25742,217 +25532,6 @@
           </a:p>
         </p:txBody>
       </p:sp>
-      <p:sp>
-        <p:nvSpPr>
-          <p:cNvPr id="8" name="Slide Number Placeholder 13">
-            <a:extLst>
-              <a:ext uri="{FF2B5EF4-FFF2-40B4-BE49-F238E27FC236}">
-                <a16:creationId xmlns:a16="http://schemas.microsoft.com/office/drawing/2014/main" id="{CFA8B549-5835-0C7F-9027-5D0D38A50DEB}"/>
-              </a:ext>
-            </a:extLst>
-          </p:cNvPr>
-          <p:cNvSpPr txBox="1">
-            <a:spLocks/>
-          </p:cNvSpPr>
-          <p:nvPr/>
-        </p:nvSpPr>
-        <p:spPr>
-          <a:xfrm>
-            <a:off x="11194169" y="6215665"/>
-            <a:ext cx="458592" cy="365125"/>
-          </a:xfrm>
-          <a:prstGeom prst="rect">
-            <a:avLst/>
-          </a:prstGeom>
-        </p:spPr>
-        <p:txBody>
-          <a:bodyPr anchor="ctr"/>
-          <a:lstStyle>
-            <a:defPPr>
-              <a:defRPr lang="zh-CN"/>
-            </a:defPPr>
-            <a:lvl1pPr marL="0" algn="ctr" defTabSz="914400" rtl="0" eaLnBrk="1" latinLnBrk="0" hangingPunct="1">
-              <a:defRPr sz="1200" b="0" i="0" kern="1200">
-                <a:solidFill>
-                  <a:schemeClr val="tx1"/>
-                </a:solidFill>
-                <a:latin typeface="Abadi" panose="020B0604020104020204" pitchFamily="34" charset="0"/>
-                <a:ea typeface="+mn-ea"/>
-                <a:cs typeface="+mn-cs"/>
-              </a:defRPr>
-            </a:lvl1pPr>
-            <a:lvl2pPr marL="457200" algn="l" defTabSz="914400" rtl="0" eaLnBrk="1" latinLnBrk="0" hangingPunct="1">
-              <a:defRPr sz="1800" kern="1200">
-                <a:solidFill>
-                  <a:schemeClr val="tx1"/>
-                </a:solidFill>
-                <a:latin typeface="+mn-lt"/>
-                <a:ea typeface="+mn-ea"/>
-                <a:cs typeface="+mn-cs"/>
-              </a:defRPr>
-            </a:lvl2pPr>
-            <a:lvl3pPr marL="914400" algn="l" defTabSz="914400" rtl="0" eaLnBrk="1" latinLnBrk="0" hangingPunct="1">
-              <a:defRPr sz="1800" kern="1200">
-                <a:solidFill>
-                  <a:schemeClr val="tx1"/>
-                </a:solidFill>
-                <a:latin typeface="+mn-lt"/>
-                <a:ea typeface="+mn-ea"/>
-                <a:cs typeface="+mn-cs"/>
-              </a:defRPr>
-            </a:lvl3pPr>
-            <a:lvl4pPr marL="1371600" algn="l" defTabSz="914400" rtl="0" eaLnBrk="1" latinLnBrk="0" hangingPunct="1">
-              <a:defRPr sz="1800" kern="1200">
-                <a:solidFill>
-                  <a:schemeClr val="tx1"/>
-                </a:solidFill>
-                <a:latin typeface="+mn-lt"/>
-                <a:ea typeface="+mn-ea"/>
-                <a:cs typeface="+mn-cs"/>
-              </a:defRPr>
-            </a:lvl4pPr>
-            <a:lvl5pPr marL="1828800" algn="l" defTabSz="914400" rtl="0" eaLnBrk="1" latinLnBrk="0" hangingPunct="1">
-              <a:defRPr sz="1800" kern="1200">
-                <a:solidFill>
-                  <a:schemeClr val="tx1"/>
-                </a:solidFill>
-                <a:latin typeface="+mn-lt"/>
-                <a:ea typeface="+mn-ea"/>
-                <a:cs typeface="+mn-cs"/>
-              </a:defRPr>
-            </a:lvl5pPr>
-            <a:lvl6pPr marL="2286000" algn="l" defTabSz="914400" rtl="0" eaLnBrk="1" latinLnBrk="0" hangingPunct="1">
-              <a:defRPr sz="1800" kern="1200">
-                <a:solidFill>
-                  <a:schemeClr val="tx1"/>
-                </a:solidFill>
-                <a:latin typeface="+mn-lt"/>
-                <a:ea typeface="+mn-ea"/>
-                <a:cs typeface="+mn-cs"/>
-              </a:defRPr>
-            </a:lvl6pPr>
-            <a:lvl7pPr marL="2743200" algn="l" defTabSz="914400" rtl="0" eaLnBrk="1" latinLnBrk="0" hangingPunct="1">
-              <a:defRPr sz="1800" kern="1200">
-                <a:solidFill>
-                  <a:schemeClr val="tx1"/>
-                </a:solidFill>
-                <a:latin typeface="+mn-lt"/>
-                <a:ea typeface="+mn-ea"/>
-                <a:cs typeface="+mn-cs"/>
-              </a:defRPr>
-            </a:lvl7pPr>
-            <a:lvl8pPr marL="3200400" algn="l" defTabSz="914400" rtl="0" eaLnBrk="1" latinLnBrk="0" hangingPunct="1">
-              <a:defRPr sz="1800" kern="1200">
-                <a:solidFill>
-                  <a:schemeClr val="tx1"/>
-                </a:solidFill>
-                <a:latin typeface="+mn-lt"/>
-                <a:ea typeface="+mn-ea"/>
-                <a:cs typeface="+mn-cs"/>
-              </a:defRPr>
-            </a:lvl8pPr>
-            <a:lvl9pPr marL="3657600" algn="l" defTabSz="914400" rtl="0" eaLnBrk="1" latinLnBrk="0" hangingPunct="1">
-              <a:defRPr sz="1800" kern="1200">
-                <a:solidFill>
-                  <a:schemeClr val="tx1"/>
-                </a:solidFill>
-                <a:latin typeface="+mn-lt"/>
-                <a:ea typeface="+mn-ea"/>
-                <a:cs typeface="+mn-cs"/>
-              </a:defRPr>
-            </a:lvl9pPr>
-          </a:lstStyle>
-          <a:p>
-            <a:pPr marL="0" marR="0" lvl="0" indent="0" algn="ctr" defTabSz="914400" rtl="0" eaLnBrk="1" fontAlgn="auto" latinLnBrk="0" hangingPunct="1">
-              <a:lnSpc>
-                <a:spcPct val="100000"/>
-              </a:lnSpc>
-              <a:spcBef>
-                <a:spcPts val="0"/>
-              </a:spcBef>
-              <a:spcAft>
-                <a:spcPts val="0"/>
-              </a:spcAft>
-              <a:buClrTx/>
-              <a:buSzTx/>
-              <a:buFontTx/>
-              <a:buNone/>
-              <a:tabLst/>
-              <a:defRPr/>
-            </a:pPr>
-            <a:fld id="{47FEACEE-25B4-4A2D-B147-27296E36371D}" type="slidenum">
-              <a:rPr kumimoji="0" lang="zh-CN" altLang="en-US" sz="1200" u="none" strike="noStrike" kern="1200" cap="none" spc="0" normalizeH="0" baseline="0" noProof="0" smtClean="0">
-                <a:ln>
-                  <a:noFill/>
-                </a:ln>
-                <a:solidFill>
-                  <a:schemeClr val="bg1"/>
-                </a:solidFill>
-                <a:effectLst/>
-                <a:uLnTx/>
-                <a:uFillTx/>
-              </a:rPr>
-              <a:pPr marL="0" marR="0" lvl="0" indent="0" algn="ctr" defTabSz="914400" rtl="0" eaLnBrk="1" fontAlgn="auto" latinLnBrk="0" hangingPunct="1">
-                <a:lnSpc>
-                  <a:spcPct val="100000"/>
-                </a:lnSpc>
-                <a:spcBef>
-                  <a:spcPts val="0"/>
-                </a:spcBef>
-                <a:spcAft>
-                  <a:spcPts val="0"/>
-                </a:spcAft>
-                <a:buClrTx/>
-                <a:buSzTx/>
-                <a:buFontTx/>
-                <a:buNone/>
-                <a:tabLst/>
-                <a:defRPr/>
-              </a:pPr>
-              <a:t>11</a:t>
-            </a:fld>
-            <a:endParaRPr kumimoji="0" lang="zh-CN" altLang="en-US" sz="1200" u="none" strike="noStrike" kern="1200" cap="none" spc="0" normalizeH="0" baseline="0" noProof="0" dirty="0">
-              <a:ln>
-                <a:noFill/>
-              </a:ln>
-              <a:solidFill>
-                <a:schemeClr val="bg1"/>
-              </a:solidFill>
-              <a:effectLst/>
-              <a:uLnTx/>
-              <a:uFillTx/>
-            </a:endParaRPr>
-          </a:p>
-        </p:txBody>
-      </p:sp>
-      <p:sp>
-        <p:nvSpPr>
-          <p:cNvPr id="4" name="Footer Placeholder 3">
-            <a:extLst>
-              <a:ext uri="{FF2B5EF4-FFF2-40B4-BE49-F238E27FC236}">
-                <a16:creationId xmlns:a16="http://schemas.microsoft.com/office/drawing/2014/main" id="{15D16185-55D3-A290-727A-4996BB9F0A9F}"/>
-              </a:ext>
-            </a:extLst>
-          </p:cNvPr>
-          <p:cNvSpPr>
-            <a:spLocks noGrp="1"/>
-          </p:cNvSpPr>
-          <p:nvPr>
-            <p:ph type="ftr" sz="quarter" idx="28"/>
-          </p:nvPr>
-        </p:nvSpPr>
-        <p:spPr/>
-        <p:txBody>
-          <a:bodyPr/>
-          <a:lstStyle/>
-          <a:p>
-            <a:r>
-              <a:rPr lang="en-US" noProof="0" dirty="0"/>
-              <a:t>Cyclistic – Rider Trends</a:t>
-            </a:r>
-          </a:p>
-        </p:txBody>
-      </p:sp>
       <p:pic>
         <p:nvPicPr>
           <p:cNvPr id="5" name="Picture 4" descr="A picture containing website&#10;&#10;Description automatically generated">
@@ -26071,217 +25650,6 @@
           </a:p>
         </p:txBody>
       </p:sp>
-      <p:sp>
-        <p:nvSpPr>
-          <p:cNvPr id="8" name="Slide Number Placeholder 13">
-            <a:extLst>
-              <a:ext uri="{FF2B5EF4-FFF2-40B4-BE49-F238E27FC236}">
-                <a16:creationId xmlns:a16="http://schemas.microsoft.com/office/drawing/2014/main" id="{CFA8B549-5835-0C7F-9027-5D0D38A50DEB}"/>
-              </a:ext>
-            </a:extLst>
-          </p:cNvPr>
-          <p:cNvSpPr txBox="1">
-            <a:spLocks/>
-          </p:cNvSpPr>
-          <p:nvPr/>
-        </p:nvSpPr>
-        <p:spPr>
-          <a:xfrm>
-            <a:off x="11194169" y="6215665"/>
-            <a:ext cx="458592" cy="365125"/>
-          </a:xfrm>
-          <a:prstGeom prst="rect">
-            <a:avLst/>
-          </a:prstGeom>
-        </p:spPr>
-        <p:txBody>
-          <a:bodyPr anchor="ctr"/>
-          <a:lstStyle>
-            <a:defPPr>
-              <a:defRPr lang="zh-CN"/>
-            </a:defPPr>
-            <a:lvl1pPr marL="0" algn="ctr" defTabSz="914400" rtl="0" eaLnBrk="1" latinLnBrk="0" hangingPunct="1">
-              <a:defRPr sz="1200" b="0" i="0" kern="1200">
-                <a:solidFill>
-                  <a:schemeClr val="tx1"/>
-                </a:solidFill>
-                <a:latin typeface="Abadi" panose="020B0604020104020204" pitchFamily="34" charset="0"/>
-                <a:ea typeface="+mn-ea"/>
-                <a:cs typeface="+mn-cs"/>
-              </a:defRPr>
-            </a:lvl1pPr>
-            <a:lvl2pPr marL="457200" algn="l" defTabSz="914400" rtl="0" eaLnBrk="1" latinLnBrk="0" hangingPunct="1">
-              <a:defRPr sz="1800" kern="1200">
-                <a:solidFill>
-                  <a:schemeClr val="tx1"/>
-                </a:solidFill>
-                <a:latin typeface="+mn-lt"/>
-                <a:ea typeface="+mn-ea"/>
-                <a:cs typeface="+mn-cs"/>
-              </a:defRPr>
-            </a:lvl2pPr>
-            <a:lvl3pPr marL="914400" algn="l" defTabSz="914400" rtl="0" eaLnBrk="1" latinLnBrk="0" hangingPunct="1">
-              <a:defRPr sz="1800" kern="1200">
-                <a:solidFill>
-                  <a:schemeClr val="tx1"/>
-                </a:solidFill>
-                <a:latin typeface="+mn-lt"/>
-                <a:ea typeface="+mn-ea"/>
-                <a:cs typeface="+mn-cs"/>
-              </a:defRPr>
-            </a:lvl3pPr>
-            <a:lvl4pPr marL="1371600" algn="l" defTabSz="914400" rtl="0" eaLnBrk="1" latinLnBrk="0" hangingPunct="1">
-              <a:defRPr sz="1800" kern="1200">
-                <a:solidFill>
-                  <a:schemeClr val="tx1"/>
-                </a:solidFill>
-                <a:latin typeface="+mn-lt"/>
-                <a:ea typeface="+mn-ea"/>
-                <a:cs typeface="+mn-cs"/>
-              </a:defRPr>
-            </a:lvl4pPr>
-            <a:lvl5pPr marL="1828800" algn="l" defTabSz="914400" rtl="0" eaLnBrk="1" latinLnBrk="0" hangingPunct="1">
-              <a:defRPr sz="1800" kern="1200">
-                <a:solidFill>
-                  <a:schemeClr val="tx1"/>
-                </a:solidFill>
-                <a:latin typeface="+mn-lt"/>
-                <a:ea typeface="+mn-ea"/>
-                <a:cs typeface="+mn-cs"/>
-              </a:defRPr>
-            </a:lvl5pPr>
-            <a:lvl6pPr marL="2286000" algn="l" defTabSz="914400" rtl="0" eaLnBrk="1" latinLnBrk="0" hangingPunct="1">
-              <a:defRPr sz="1800" kern="1200">
-                <a:solidFill>
-                  <a:schemeClr val="tx1"/>
-                </a:solidFill>
-                <a:latin typeface="+mn-lt"/>
-                <a:ea typeface="+mn-ea"/>
-                <a:cs typeface="+mn-cs"/>
-              </a:defRPr>
-            </a:lvl6pPr>
-            <a:lvl7pPr marL="2743200" algn="l" defTabSz="914400" rtl="0" eaLnBrk="1" latinLnBrk="0" hangingPunct="1">
-              <a:defRPr sz="1800" kern="1200">
-                <a:solidFill>
-                  <a:schemeClr val="tx1"/>
-                </a:solidFill>
-                <a:latin typeface="+mn-lt"/>
-                <a:ea typeface="+mn-ea"/>
-                <a:cs typeface="+mn-cs"/>
-              </a:defRPr>
-            </a:lvl7pPr>
-            <a:lvl8pPr marL="3200400" algn="l" defTabSz="914400" rtl="0" eaLnBrk="1" latinLnBrk="0" hangingPunct="1">
-              <a:defRPr sz="1800" kern="1200">
-                <a:solidFill>
-                  <a:schemeClr val="tx1"/>
-                </a:solidFill>
-                <a:latin typeface="+mn-lt"/>
-                <a:ea typeface="+mn-ea"/>
-                <a:cs typeface="+mn-cs"/>
-              </a:defRPr>
-            </a:lvl8pPr>
-            <a:lvl9pPr marL="3657600" algn="l" defTabSz="914400" rtl="0" eaLnBrk="1" latinLnBrk="0" hangingPunct="1">
-              <a:defRPr sz="1800" kern="1200">
-                <a:solidFill>
-                  <a:schemeClr val="tx1"/>
-                </a:solidFill>
-                <a:latin typeface="+mn-lt"/>
-                <a:ea typeface="+mn-ea"/>
-                <a:cs typeface="+mn-cs"/>
-              </a:defRPr>
-            </a:lvl9pPr>
-          </a:lstStyle>
-          <a:p>
-            <a:pPr marL="0" marR="0" lvl="0" indent="0" algn="ctr" defTabSz="914400" rtl="0" eaLnBrk="1" fontAlgn="auto" latinLnBrk="0" hangingPunct="1">
-              <a:lnSpc>
-                <a:spcPct val="100000"/>
-              </a:lnSpc>
-              <a:spcBef>
-                <a:spcPts val="0"/>
-              </a:spcBef>
-              <a:spcAft>
-                <a:spcPts val="0"/>
-              </a:spcAft>
-              <a:buClrTx/>
-              <a:buSzTx/>
-              <a:buFontTx/>
-              <a:buNone/>
-              <a:tabLst/>
-              <a:defRPr/>
-            </a:pPr>
-            <a:fld id="{47FEACEE-25B4-4A2D-B147-27296E36371D}" type="slidenum">
-              <a:rPr kumimoji="0" lang="zh-CN" altLang="en-US" sz="1200" u="none" strike="noStrike" kern="1200" cap="none" spc="0" normalizeH="0" baseline="0" noProof="0" smtClean="0">
-                <a:ln>
-                  <a:noFill/>
-                </a:ln>
-                <a:solidFill>
-                  <a:schemeClr val="bg1"/>
-                </a:solidFill>
-                <a:effectLst/>
-                <a:uLnTx/>
-                <a:uFillTx/>
-              </a:rPr>
-              <a:pPr marL="0" marR="0" lvl="0" indent="0" algn="ctr" defTabSz="914400" rtl="0" eaLnBrk="1" fontAlgn="auto" latinLnBrk="0" hangingPunct="1">
-                <a:lnSpc>
-                  <a:spcPct val="100000"/>
-                </a:lnSpc>
-                <a:spcBef>
-                  <a:spcPts val="0"/>
-                </a:spcBef>
-                <a:spcAft>
-                  <a:spcPts val="0"/>
-                </a:spcAft>
-                <a:buClrTx/>
-                <a:buSzTx/>
-                <a:buFontTx/>
-                <a:buNone/>
-                <a:tabLst/>
-                <a:defRPr/>
-              </a:pPr>
-              <a:t>12</a:t>
-            </a:fld>
-            <a:endParaRPr kumimoji="0" lang="zh-CN" altLang="en-US" sz="1200" u="none" strike="noStrike" kern="1200" cap="none" spc="0" normalizeH="0" baseline="0" noProof="0" dirty="0">
-              <a:ln>
-                <a:noFill/>
-              </a:ln>
-              <a:solidFill>
-                <a:schemeClr val="bg1"/>
-              </a:solidFill>
-              <a:effectLst/>
-              <a:uLnTx/>
-              <a:uFillTx/>
-            </a:endParaRPr>
-          </a:p>
-        </p:txBody>
-      </p:sp>
-      <p:sp>
-        <p:nvSpPr>
-          <p:cNvPr id="4" name="Footer Placeholder 3">
-            <a:extLst>
-              <a:ext uri="{FF2B5EF4-FFF2-40B4-BE49-F238E27FC236}">
-                <a16:creationId xmlns:a16="http://schemas.microsoft.com/office/drawing/2014/main" id="{15D16185-55D3-A290-727A-4996BB9F0A9F}"/>
-              </a:ext>
-            </a:extLst>
-          </p:cNvPr>
-          <p:cNvSpPr>
-            <a:spLocks noGrp="1"/>
-          </p:cNvSpPr>
-          <p:nvPr>
-            <p:ph type="ftr" sz="quarter" idx="28"/>
-          </p:nvPr>
-        </p:nvSpPr>
-        <p:spPr/>
-        <p:txBody>
-          <a:bodyPr/>
-          <a:lstStyle/>
-          <a:p>
-            <a:r>
-              <a:rPr lang="en-US" noProof="0" dirty="0"/>
-              <a:t>Cyclistic – Rider Trends</a:t>
-            </a:r>
-          </a:p>
-        </p:txBody>
-      </p:sp>
       <p:pic>
         <p:nvPicPr>
           <p:cNvPr id="7" name="Picture 6">
@@ -26369,217 +25737,6 @@
           </a:p>
         </p:txBody>
       </p:sp>
-      <p:sp>
-        <p:nvSpPr>
-          <p:cNvPr id="8" name="Slide Number Placeholder 13">
-            <a:extLst>
-              <a:ext uri="{FF2B5EF4-FFF2-40B4-BE49-F238E27FC236}">
-                <a16:creationId xmlns:a16="http://schemas.microsoft.com/office/drawing/2014/main" id="{CFA8B549-5835-0C7F-9027-5D0D38A50DEB}"/>
-              </a:ext>
-            </a:extLst>
-          </p:cNvPr>
-          <p:cNvSpPr txBox="1">
-            <a:spLocks/>
-          </p:cNvSpPr>
-          <p:nvPr/>
-        </p:nvSpPr>
-        <p:spPr>
-          <a:xfrm>
-            <a:off x="11194169" y="6215665"/>
-            <a:ext cx="458592" cy="365125"/>
-          </a:xfrm>
-          <a:prstGeom prst="rect">
-            <a:avLst/>
-          </a:prstGeom>
-        </p:spPr>
-        <p:txBody>
-          <a:bodyPr anchor="ctr"/>
-          <a:lstStyle>
-            <a:defPPr>
-              <a:defRPr lang="zh-CN"/>
-            </a:defPPr>
-            <a:lvl1pPr marL="0" algn="ctr" defTabSz="914400" rtl="0" eaLnBrk="1" latinLnBrk="0" hangingPunct="1">
-              <a:defRPr sz="1200" b="0" i="0" kern="1200">
-                <a:solidFill>
-                  <a:schemeClr val="tx1"/>
-                </a:solidFill>
-                <a:latin typeface="Abadi" panose="020B0604020104020204" pitchFamily="34" charset="0"/>
-                <a:ea typeface="+mn-ea"/>
-                <a:cs typeface="+mn-cs"/>
-              </a:defRPr>
-            </a:lvl1pPr>
-            <a:lvl2pPr marL="457200" algn="l" defTabSz="914400" rtl="0" eaLnBrk="1" latinLnBrk="0" hangingPunct="1">
-              <a:defRPr sz="1800" kern="1200">
-                <a:solidFill>
-                  <a:schemeClr val="tx1"/>
-                </a:solidFill>
-                <a:latin typeface="+mn-lt"/>
-                <a:ea typeface="+mn-ea"/>
-                <a:cs typeface="+mn-cs"/>
-              </a:defRPr>
-            </a:lvl2pPr>
-            <a:lvl3pPr marL="914400" algn="l" defTabSz="914400" rtl="0" eaLnBrk="1" latinLnBrk="0" hangingPunct="1">
-              <a:defRPr sz="1800" kern="1200">
-                <a:solidFill>
-                  <a:schemeClr val="tx1"/>
-                </a:solidFill>
-                <a:latin typeface="+mn-lt"/>
-                <a:ea typeface="+mn-ea"/>
-                <a:cs typeface="+mn-cs"/>
-              </a:defRPr>
-            </a:lvl3pPr>
-            <a:lvl4pPr marL="1371600" algn="l" defTabSz="914400" rtl="0" eaLnBrk="1" latinLnBrk="0" hangingPunct="1">
-              <a:defRPr sz="1800" kern="1200">
-                <a:solidFill>
-                  <a:schemeClr val="tx1"/>
-                </a:solidFill>
-                <a:latin typeface="+mn-lt"/>
-                <a:ea typeface="+mn-ea"/>
-                <a:cs typeface="+mn-cs"/>
-              </a:defRPr>
-            </a:lvl4pPr>
-            <a:lvl5pPr marL="1828800" algn="l" defTabSz="914400" rtl="0" eaLnBrk="1" latinLnBrk="0" hangingPunct="1">
-              <a:defRPr sz="1800" kern="1200">
-                <a:solidFill>
-                  <a:schemeClr val="tx1"/>
-                </a:solidFill>
-                <a:latin typeface="+mn-lt"/>
-                <a:ea typeface="+mn-ea"/>
-                <a:cs typeface="+mn-cs"/>
-              </a:defRPr>
-            </a:lvl5pPr>
-            <a:lvl6pPr marL="2286000" algn="l" defTabSz="914400" rtl="0" eaLnBrk="1" latinLnBrk="0" hangingPunct="1">
-              <a:defRPr sz="1800" kern="1200">
-                <a:solidFill>
-                  <a:schemeClr val="tx1"/>
-                </a:solidFill>
-                <a:latin typeface="+mn-lt"/>
-                <a:ea typeface="+mn-ea"/>
-                <a:cs typeface="+mn-cs"/>
-              </a:defRPr>
-            </a:lvl6pPr>
-            <a:lvl7pPr marL="2743200" algn="l" defTabSz="914400" rtl="0" eaLnBrk="1" latinLnBrk="0" hangingPunct="1">
-              <a:defRPr sz="1800" kern="1200">
-                <a:solidFill>
-                  <a:schemeClr val="tx1"/>
-                </a:solidFill>
-                <a:latin typeface="+mn-lt"/>
-                <a:ea typeface="+mn-ea"/>
-                <a:cs typeface="+mn-cs"/>
-              </a:defRPr>
-            </a:lvl7pPr>
-            <a:lvl8pPr marL="3200400" algn="l" defTabSz="914400" rtl="0" eaLnBrk="1" latinLnBrk="0" hangingPunct="1">
-              <a:defRPr sz="1800" kern="1200">
-                <a:solidFill>
-                  <a:schemeClr val="tx1"/>
-                </a:solidFill>
-                <a:latin typeface="+mn-lt"/>
-                <a:ea typeface="+mn-ea"/>
-                <a:cs typeface="+mn-cs"/>
-              </a:defRPr>
-            </a:lvl8pPr>
-            <a:lvl9pPr marL="3657600" algn="l" defTabSz="914400" rtl="0" eaLnBrk="1" latinLnBrk="0" hangingPunct="1">
-              <a:defRPr sz="1800" kern="1200">
-                <a:solidFill>
-                  <a:schemeClr val="tx1"/>
-                </a:solidFill>
-                <a:latin typeface="+mn-lt"/>
-                <a:ea typeface="+mn-ea"/>
-                <a:cs typeface="+mn-cs"/>
-              </a:defRPr>
-            </a:lvl9pPr>
-          </a:lstStyle>
-          <a:p>
-            <a:pPr marL="0" marR="0" lvl="0" indent="0" algn="ctr" defTabSz="914400" rtl="0" eaLnBrk="1" fontAlgn="auto" latinLnBrk="0" hangingPunct="1">
-              <a:lnSpc>
-                <a:spcPct val="100000"/>
-              </a:lnSpc>
-              <a:spcBef>
-                <a:spcPts val="0"/>
-              </a:spcBef>
-              <a:spcAft>
-                <a:spcPts val="0"/>
-              </a:spcAft>
-              <a:buClrTx/>
-              <a:buSzTx/>
-              <a:buFontTx/>
-              <a:buNone/>
-              <a:tabLst/>
-              <a:defRPr/>
-            </a:pPr>
-            <a:fld id="{47FEACEE-25B4-4A2D-B147-27296E36371D}" type="slidenum">
-              <a:rPr kumimoji="0" lang="zh-CN" altLang="en-US" sz="1200" u="none" strike="noStrike" kern="1200" cap="none" spc="0" normalizeH="0" baseline="0" noProof="0" smtClean="0">
-                <a:ln>
-                  <a:noFill/>
-                </a:ln>
-                <a:solidFill>
-                  <a:schemeClr val="bg1"/>
-                </a:solidFill>
-                <a:effectLst/>
-                <a:uLnTx/>
-                <a:uFillTx/>
-              </a:rPr>
-              <a:pPr marL="0" marR="0" lvl="0" indent="0" algn="ctr" defTabSz="914400" rtl="0" eaLnBrk="1" fontAlgn="auto" latinLnBrk="0" hangingPunct="1">
-                <a:lnSpc>
-                  <a:spcPct val="100000"/>
-                </a:lnSpc>
-                <a:spcBef>
-                  <a:spcPts val="0"/>
-                </a:spcBef>
-                <a:spcAft>
-                  <a:spcPts val="0"/>
-                </a:spcAft>
-                <a:buClrTx/>
-                <a:buSzTx/>
-                <a:buFontTx/>
-                <a:buNone/>
-                <a:tabLst/>
-                <a:defRPr/>
-              </a:pPr>
-              <a:t>13</a:t>
-            </a:fld>
-            <a:endParaRPr kumimoji="0" lang="zh-CN" altLang="en-US" sz="1200" u="none" strike="noStrike" kern="1200" cap="none" spc="0" normalizeH="0" baseline="0" noProof="0" dirty="0">
-              <a:ln>
-                <a:noFill/>
-              </a:ln>
-              <a:solidFill>
-                <a:schemeClr val="bg1"/>
-              </a:solidFill>
-              <a:effectLst/>
-              <a:uLnTx/>
-              <a:uFillTx/>
-            </a:endParaRPr>
-          </a:p>
-        </p:txBody>
-      </p:sp>
-      <p:sp>
-        <p:nvSpPr>
-          <p:cNvPr id="4" name="Footer Placeholder 3">
-            <a:extLst>
-              <a:ext uri="{FF2B5EF4-FFF2-40B4-BE49-F238E27FC236}">
-                <a16:creationId xmlns:a16="http://schemas.microsoft.com/office/drawing/2014/main" id="{15D16185-55D3-A290-727A-4996BB9F0A9F}"/>
-              </a:ext>
-            </a:extLst>
-          </p:cNvPr>
-          <p:cNvSpPr>
-            <a:spLocks noGrp="1"/>
-          </p:cNvSpPr>
-          <p:nvPr>
-            <p:ph type="ftr" sz="quarter" idx="28"/>
-          </p:nvPr>
-        </p:nvSpPr>
-        <p:spPr/>
-        <p:txBody>
-          <a:bodyPr/>
-          <a:lstStyle/>
-          <a:p>
-            <a:r>
-              <a:rPr lang="en-US" noProof="0" dirty="0"/>
-              <a:t>Cyclistic – Rider Trends</a:t>
-            </a:r>
-          </a:p>
-        </p:txBody>
-      </p:sp>
       <p:pic>
         <p:nvPicPr>
           <p:cNvPr id="7" name="Picture 6">
@@ -26667,217 +25824,6 @@
           </a:p>
         </p:txBody>
       </p:sp>
-      <p:sp>
-        <p:nvSpPr>
-          <p:cNvPr id="8" name="Slide Number Placeholder 13">
-            <a:extLst>
-              <a:ext uri="{FF2B5EF4-FFF2-40B4-BE49-F238E27FC236}">
-                <a16:creationId xmlns:a16="http://schemas.microsoft.com/office/drawing/2014/main" id="{CFA8B549-5835-0C7F-9027-5D0D38A50DEB}"/>
-              </a:ext>
-            </a:extLst>
-          </p:cNvPr>
-          <p:cNvSpPr txBox="1">
-            <a:spLocks/>
-          </p:cNvSpPr>
-          <p:nvPr/>
-        </p:nvSpPr>
-        <p:spPr>
-          <a:xfrm>
-            <a:off x="11194169" y="6215665"/>
-            <a:ext cx="458592" cy="365125"/>
-          </a:xfrm>
-          <a:prstGeom prst="rect">
-            <a:avLst/>
-          </a:prstGeom>
-        </p:spPr>
-        <p:txBody>
-          <a:bodyPr anchor="ctr"/>
-          <a:lstStyle>
-            <a:defPPr>
-              <a:defRPr lang="zh-CN"/>
-            </a:defPPr>
-            <a:lvl1pPr marL="0" algn="ctr" defTabSz="914400" rtl="0" eaLnBrk="1" latinLnBrk="0" hangingPunct="1">
-              <a:defRPr sz="1200" b="0" i="0" kern="1200">
-                <a:solidFill>
-                  <a:schemeClr val="tx1"/>
-                </a:solidFill>
-                <a:latin typeface="Abadi" panose="020B0604020104020204" pitchFamily="34" charset="0"/>
-                <a:ea typeface="+mn-ea"/>
-                <a:cs typeface="+mn-cs"/>
-              </a:defRPr>
-            </a:lvl1pPr>
-            <a:lvl2pPr marL="457200" algn="l" defTabSz="914400" rtl="0" eaLnBrk="1" latinLnBrk="0" hangingPunct="1">
-              <a:defRPr sz="1800" kern="1200">
-                <a:solidFill>
-                  <a:schemeClr val="tx1"/>
-                </a:solidFill>
-                <a:latin typeface="+mn-lt"/>
-                <a:ea typeface="+mn-ea"/>
-                <a:cs typeface="+mn-cs"/>
-              </a:defRPr>
-            </a:lvl2pPr>
-            <a:lvl3pPr marL="914400" algn="l" defTabSz="914400" rtl="0" eaLnBrk="1" latinLnBrk="0" hangingPunct="1">
-              <a:defRPr sz="1800" kern="1200">
-                <a:solidFill>
-                  <a:schemeClr val="tx1"/>
-                </a:solidFill>
-                <a:latin typeface="+mn-lt"/>
-                <a:ea typeface="+mn-ea"/>
-                <a:cs typeface="+mn-cs"/>
-              </a:defRPr>
-            </a:lvl3pPr>
-            <a:lvl4pPr marL="1371600" algn="l" defTabSz="914400" rtl="0" eaLnBrk="1" latinLnBrk="0" hangingPunct="1">
-              <a:defRPr sz="1800" kern="1200">
-                <a:solidFill>
-                  <a:schemeClr val="tx1"/>
-                </a:solidFill>
-                <a:latin typeface="+mn-lt"/>
-                <a:ea typeface="+mn-ea"/>
-                <a:cs typeface="+mn-cs"/>
-              </a:defRPr>
-            </a:lvl4pPr>
-            <a:lvl5pPr marL="1828800" algn="l" defTabSz="914400" rtl="0" eaLnBrk="1" latinLnBrk="0" hangingPunct="1">
-              <a:defRPr sz="1800" kern="1200">
-                <a:solidFill>
-                  <a:schemeClr val="tx1"/>
-                </a:solidFill>
-                <a:latin typeface="+mn-lt"/>
-                <a:ea typeface="+mn-ea"/>
-                <a:cs typeface="+mn-cs"/>
-              </a:defRPr>
-            </a:lvl5pPr>
-            <a:lvl6pPr marL="2286000" algn="l" defTabSz="914400" rtl="0" eaLnBrk="1" latinLnBrk="0" hangingPunct="1">
-              <a:defRPr sz="1800" kern="1200">
-                <a:solidFill>
-                  <a:schemeClr val="tx1"/>
-                </a:solidFill>
-                <a:latin typeface="+mn-lt"/>
-                <a:ea typeface="+mn-ea"/>
-                <a:cs typeface="+mn-cs"/>
-              </a:defRPr>
-            </a:lvl6pPr>
-            <a:lvl7pPr marL="2743200" algn="l" defTabSz="914400" rtl="0" eaLnBrk="1" latinLnBrk="0" hangingPunct="1">
-              <a:defRPr sz="1800" kern="1200">
-                <a:solidFill>
-                  <a:schemeClr val="tx1"/>
-                </a:solidFill>
-                <a:latin typeface="+mn-lt"/>
-                <a:ea typeface="+mn-ea"/>
-                <a:cs typeface="+mn-cs"/>
-              </a:defRPr>
-            </a:lvl7pPr>
-            <a:lvl8pPr marL="3200400" algn="l" defTabSz="914400" rtl="0" eaLnBrk="1" latinLnBrk="0" hangingPunct="1">
-              <a:defRPr sz="1800" kern="1200">
-                <a:solidFill>
-                  <a:schemeClr val="tx1"/>
-                </a:solidFill>
-                <a:latin typeface="+mn-lt"/>
-                <a:ea typeface="+mn-ea"/>
-                <a:cs typeface="+mn-cs"/>
-              </a:defRPr>
-            </a:lvl8pPr>
-            <a:lvl9pPr marL="3657600" algn="l" defTabSz="914400" rtl="0" eaLnBrk="1" latinLnBrk="0" hangingPunct="1">
-              <a:defRPr sz="1800" kern="1200">
-                <a:solidFill>
-                  <a:schemeClr val="tx1"/>
-                </a:solidFill>
-                <a:latin typeface="+mn-lt"/>
-                <a:ea typeface="+mn-ea"/>
-                <a:cs typeface="+mn-cs"/>
-              </a:defRPr>
-            </a:lvl9pPr>
-          </a:lstStyle>
-          <a:p>
-            <a:pPr marL="0" marR="0" lvl="0" indent="0" algn="ctr" defTabSz="914400" rtl="0" eaLnBrk="1" fontAlgn="auto" latinLnBrk="0" hangingPunct="1">
-              <a:lnSpc>
-                <a:spcPct val="100000"/>
-              </a:lnSpc>
-              <a:spcBef>
-                <a:spcPts val="0"/>
-              </a:spcBef>
-              <a:spcAft>
-                <a:spcPts val="0"/>
-              </a:spcAft>
-              <a:buClrTx/>
-              <a:buSzTx/>
-              <a:buFontTx/>
-              <a:buNone/>
-              <a:tabLst/>
-              <a:defRPr/>
-            </a:pPr>
-            <a:fld id="{47FEACEE-25B4-4A2D-B147-27296E36371D}" type="slidenum">
-              <a:rPr kumimoji="0" lang="zh-CN" altLang="en-US" sz="1200" u="none" strike="noStrike" kern="1200" cap="none" spc="0" normalizeH="0" baseline="0" noProof="0" smtClean="0">
-                <a:ln>
-                  <a:noFill/>
-                </a:ln>
-                <a:solidFill>
-                  <a:schemeClr val="bg1"/>
-                </a:solidFill>
-                <a:effectLst/>
-                <a:uLnTx/>
-                <a:uFillTx/>
-              </a:rPr>
-              <a:pPr marL="0" marR="0" lvl="0" indent="0" algn="ctr" defTabSz="914400" rtl="0" eaLnBrk="1" fontAlgn="auto" latinLnBrk="0" hangingPunct="1">
-                <a:lnSpc>
-                  <a:spcPct val="100000"/>
-                </a:lnSpc>
-                <a:spcBef>
-                  <a:spcPts val="0"/>
-                </a:spcBef>
-                <a:spcAft>
-                  <a:spcPts val="0"/>
-                </a:spcAft>
-                <a:buClrTx/>
-                <a:buSzTx/>
-                <a:buFontTx/>
-                <a:buNone/>
-                <a:tabLst/>
-                <a:defRPr/>
-              </a:pPr>
-              <a:t>14</a:t>
-            </a:fld>
-            <a:endParaRPr kumimoji="0" lang="zh-CN" altLang="en-US" sz="1200" u="none" strike="noStrike" kern="1200" cap="none" spc="0" normalizeH="0" baseline="0" noProof="0" dirty="0">
-              <a:ln>
-                <a:noFill/>
-              </a:ln>
-              <a:solidFill>
-                <a:schemeClr val="bg1"/>
-              </a:solidFill>
-              <a:effectLst/>
-              <a:uLnTx/>
-              <a:uFillTx/>
-            </a:endParaRPr>
-          </a:p>
-        </p:txBody>
-      </p:sp>
-      <p:sp>
-        <p:nvSpPr>
-          <p:cNvPr id="4" name="Footer Placeholder 3">
-            <a:extLst>
-              <a:ext uri="{FF2B5EF4-FFF2-40B4-BE49-F238E27FC236}">
-                <a16:creationId xmlns:a16="http://schemas.microsoft.com/office/drawing/2014/main" id="{15D16185-55D3-A290-727A-4996BB9F0A9F}"/>
-              </a:ext>
-            </a:extLst>
-          </p:cNvPr>
-          <p:cNvSpPr>
-            <a:spLocks noGrp="1"/>
-          </p:cNvSpPr>
-          <p:nvPr>
-            <p:ph type="ftr" sz="quarter" idx="28"/>
-          </p:nvPr>
-        </p:nvSpPr>
-        <p:spPr/>
-        <p:txBody>
-          <a:bodyPr/>
-          <a:lstStyle/>
-          <a:p>
-            <a:r>
-              <a:rPr lang="en-US" noProof="0" dirty="0"/>
-              <a:t>Cyclistic – Rider Trends</a:t>
-            </a:r>
-          </a:p>
-        </p:txBody>
-      </p:sp>
       <p:pic>
         <p:nvPicPr>
           <p:cNvPr id="7" name="Picture 6">
@@ -27044,7 +25990,7 @@
           <a:p>
             <a:r>
               <a:rPr lang="en-US" dirty="0"/>
-              <a:t>Bike Utilization</a:t>
+              <a:t>Bike Type Utilization</a:t>
             </a:r>
           </a:p>
         </p:txBody>
@@ -27132,60 +26078,6 @@
             </a:r>
           </a:p>
         </p:txBody>
-      </p:sp>
-      <p:sp>
-        <p:nvSpPr>
-          <p:cNvPr id="9" name="Picture Placeholder 8">
-            <a:extLst>
-              <a:ext uri="{FF2B5EF4-FFF2-40B4-BE49-F238E27FC236}">
-                <a16:creationId xmlns:a16="http://schemas.microsoft.com/office/drawing/2014/main" id="{BF925CD6-8814-3EC0-2FAD-D18ABC8F6C30}"/>
-              </a:ext>
-            </a:extLst>
-          </p:cNvPr>
-          <p:cNvSpPr>
-            <a:spLocks noGrp="1"/>
-          </p:cNvSpPr>
-          <p:nvPr>
-            <p:ph type="pic" sz="quarter" idx="36"/>
-          </p:nvPr>
-        </p:nvSpPr>
-        <p:spPr/>
-      </p:sp>
-      <p:sp>
-        <p:nvSpPr>
-          <p:cNvPr id="10" name="Picture Placeholder 9">
-            <a:extLst>
-              <a:ext uri="{FF2B5EF4-FFF2-40B4-BE49-F238E27FC236}">
-                <a16:creationId xmlns:a16="http://schemas.microsoft.com/office/drawing/2014/main" id="{D972A80F-F155-9647-609E-CAC72D28B2B4}"/>
-              </a:ext>
-            </a:extLst>
-          </p:cNvPr>
-          <p:cNvSpPr>
-            <a:spLocks noGrp="1"/>
-          </p:cNvSpPr>
-          <p:nvPr>
-            <p:ph type="pic" sz="quarter" idx="37"/>
-          </p:nvPr>
-        </p:nvSpPr>
-        <p:spPr/>
-      </p:sp>
-      <p:sp>
-        <p:nvSpPr>
-          <p:cNvPr id="11" name="Picture Placeholder 10">
-            <a:extLst>
-              <a:ext uri="{FF2B5EF4-FFF2-40B4-BE49-F238E27FC236}">
-                <a16:creationId xmlns:a16="http://schemas.microsoft.com/office/drawing/2014/main" id="{B7E47FC3-4293-DA10-26AE-1BFD616FD847}"/>
-              </a:ext>
-            </a:extLst>
-          </p:cNvPr>
-          <p:cNvSpPr>
-            <a:spLocks noGrp="1"/>
-          </p:cNvSpPr>
-          <p:nvPr>
-            <p:ph type="pic" sz="quarter" idx="38"/>
-          </p:nvPr>
-        </p:nvSpPr>
-        <p:spPr/>
       </p:sp>
     </p:spTree>
     <p:extLst>
@@ -27670,60 +26562,6 @@
           </a:p>
         </p:txBody>
       </p:sp>
-      <p:sp>
-        <p:nvSpPr>
-          <p:cNvPr id="9" name="Picture Placeholder 8">
-            <a:extLst>
-              <a:ext uri="{FF2B5EF4-FFF2-40B4-BE49-F238E27FC236}">
-                <a16:creationId xmlns:a16="http://schemas.microsoft.com/office/drawing/2014/main" id="{FADB062F-12D3-3479-B036-C06FF4E91A63}"/>
-              </a:ext>
-            </a:extLst>
-          </p:cNvPr>
-          <p:cNvSpPr>
-            <a:spLocks noGrp="1"/>
-          </p:cNvSpPr>
-          <p:nvPr>
-            <p:ph type="pic" sz="quarter" idx="36"/>
-          </p:nvPr>
-        </p:nvSpPr>
-        <p:spPr/>
-      </p:sp>
-      <p:sp>
-        <p:nvSpPr>
-          <p:cNvPr id="10" name="Picture Placeholder 9">
-            <a:extLst>
-              <a:ext uri="{FF2B5EF4-FFF2-40B4-BE49-F238E27FC236}">
-                <a16:creationId xmlns:a16="http://schemas.microsoft.com/office/drawing/2014/main" id="{ED3A5AA1-809E-A869-7A20-A9BB374F3203}"/>
-              </a:ext>
-            </a:extLst>
-          </p:cNvPr>
-          <p:cNvSpPr>
-            <a:spLocks noGrp="1"/>
-          </p:cNvSpPr>
-          <p:nvPr>
-            <p:ph type="pic" sz="quarter" idx="37"/>
-          </p:nvPr>
-        </p:nvSpPr>
-        <p:spPr/>
-      </p:sp>
-      <p:sp>
-        <p:nvSpPr>
-          <p:cNvPr id="11" name="Picture Placeholder 10">
-            <a:extLst>
-              <a:ext uri="{FF2B5EF4-FFF2-40B4-BE49-F238E27FC236}">
-                <a16:creationId xmlns:a16="http://schemas.microsoft.com/office/drawing/2014/main" id="{E1BFE2F0-C436-93F8-C13D-3EB97F5141CD}"/>
-              </a:ext>
-            </a:extLst>
-          </p:cNvPr>
-          <p:cNvSpPr>
-            <a:spLocks noGrp="1"/>
-          </p:cNvSpPr>
-          <p:nvPr>
-            <p:ph type="pic" sz="quarter" idx="38"/>
-          </p:nvPr>
-        </p:nvSpPr>
-        <p:spPr/>
-      </p:sp>
     </p:spTree>
     <p:extLst>
       <p:ext uri="{BB962C8B-B14F-4D97-AF65-F5344CB8AC3E}">
@@ -27905,6 +26743,17 @@
           <a:bodyPr/>
           <a:lstStyle/>
           <a:p>
+            <a:r>
+              <a:rPr lang="en-US" dirty="0">
+                <a:effectLst/>
+              </a:rPr>
+              <a:t>Divvy</a:t>
+            </a:r>
+            <a:br>
+              <a:rPr lang="en-US" dirty="0">
+                <a:effectLst/>
+              </a:rPr>
+            </a:br>
             <a:r>
               <a:rPr lang="en-US" dirty="0">
                 <a:effectLst/>
@@ -28360,51 +27209,6 @@
           </a:p>
         </p:txBody>
       </p:sp>
-      <p:sp>
-        <p:nvSpPr>
-          <p:cNvPr id="20" name="Footer Placeholder 19">
-            <a:extLst>
-              <a:ext uri="{FF2B5EF4-FFF2-40B4-BE49-F238E27FC236}">
-                <a16:creationId xmlns:a16="http://schemas.microsoft.com/office/drawing/2014/main" id="{1664F554-8F3F-2148-FE86-1FE8F66B856B}"/>
-              </a:ext>
-            </a:extLst>
-          </p:cNvPr>
-          <p:cNvSpPr>
-            <a:spLocks noGrp="1"/>
-          </p:cNvSpPr>
-          <p:nvPr>
-            <p:ph type="ftr" sz="quarter" idx="33"/>
-          </p:nvPr>
-        </p:nvSpPr>
-        <p:spPr>
-          <a:xfrm>
-            <a:off x="484632" y="6217920"/>
-            <a:ext cx="4114800" cy="365125"/>
-          </a:xfrm>
-        </p:spPr>
-        <p:txBody>
-          <a:bodyPr anchor="ctr">
-            <a:normAutofit/>
-          </a:bodyPr>
-          <a:lstStyle/>
-          <a:p>
-            <a:pPr>
-              <a:spcAft>
-                <a:spcPts val="600"/>
-              </a:spcAft>
-            </a:pPr>
-            <a:r>
-              <a:rPr lang="en-US" noProof="0" dirty="0"/>
-              <a:t>Cyclistic</a:t>
-            </a:r>
-            <a:r>
-              <a:rPr lang="en-US" dirty="0"/>
-              <a:t> – Rider Trends</a:t>
-            </a:r>
-            <a:endParaRPr lang="en-US" noProof="0"/>
-          </a:p>
-        </p:txBody>
-      </p:sp>
     </p:spTree>
     <p:extLst>
       <p:ext uri="{BB962C8B-B14F-4D97-AF65-F5344CB8AC3E}">
@@ -28486,8 +27290,12 @@
           <a:lstStyle/>
           <a:p>
             <a:r>
-              <a:rPr lang="en-US" dirty="0"/>
-              <a:t>Analyze rider data from the last 12 months to identify trends in usage between member and casual riders.</a:t>
+              <a:rPr lang="en-US" sz="2000" dirty="0">
+                <a:solidFill>
+                  <a:srgbClr val="D98868"/>
+                </a:solidFill>
+              </a:rPr>
+              <a:t>How do member and casual riders use Cyclistic bikes differently?</a:t>
             </a:r>
           </a:p>
         </p:txBody>
@@ -28663,10 +27471,10 @@
       </p:sp>
       <p:sp>
         <p:nvSpPr>
-          <p:cNvPr id="9" name="Slide Number Placeholder 13">
-            <a:extLst>
-              <a:ext uri="{FF2B5EF4-FFF2-40B4-BE49-F238E27FC236}">
-                <a16:creationId xmlns:a16="http://schemas.microsoft.com/office/drawing/2014/main" id="{D246665A-6901-3F62-340A-A95E775ACA48}"/>
+          <p:cNvPr id="2" name="Text Placeholder 19">
+            <a:extLst>
+              <a:ext uri="{FF2B5EF4-FFF2-40B4-BE49-F238E27FC236}">
+                <a16:creationId xmlns:a16="http://schemas.microsoft.com/office/drawing/2014/main" id="{5F5A2FBA-8D15-C8B5-78A5-A4D8F34C4ABB}"/>
               </a:ext>
             </a:extLst>
           </p:cNvPr>
@@ -28677,70 +27485,117 @@
         </p:nvSpPr>
         <p:spPr>
           <a:xfrm>
-            <a:off x="11194169" y="6215665"/>
-            <a:ext cx="458592" cy="365125"/>
+            <a:off x="509574" y="4196459"/>
+            <a:ext cx="4260180" cy="1294530"/>
           </a:xfrm>
           <a:prstGeom prst="rect">
             <a:avLst/>
           </a:prstGeom>
         </p:spPr>
         <p:txBody>
-          <a:bodyPr anchor="ctr"/>
+          <a:bodyPr vert="horz" lIns="91440" tIns="45720" rIns="91440" bIns="45720" rtlCol="0">
+            <a:noAutofit/>
+          </a:bodyPr>
           <a:lstStyle>
-            <a:defPPr>
-              <a:defRPr lang="zh-CN"/>
-            </a:defPPr>
-            <a:lvl1pPr marL="0" algn="ctr" defTabSz="914400" rtl="0" eaLnBrk="1" latinLnBrk="0" hangingPunct="1">
-              <a:defRPr sz="1200" b="0" i="0" kern="1200">
+            <a:lvl1pPr marL="0" indent="0" algn="l" defTabSz="914400" rtl="0" eaLnBrk="1" latinLnBrk="0" hangingPunct="1">
+              <a:lnSpc>
+                <a:spcPct val="100000"/>
+              </a:lnSpc>
+              <a:spcBef>
+                <a:spcPts val="1000"/>
+              </a:spcBef>
+              <a:buFont typeface="Arial" panose="020B0604020202020204" pitchFamily="34" charset="0"/>
+              <a:buNone/>
+              <a:defRPr sz="1500" b="0" kern="1200">
                 <a:solidFill>
-                  <a:schemeClr val="tx1"/>
+                  <a:schemeClr val="bg1"/>
                 </a:solidFill>
-                <a:latin typeface="Abadi" panose="020B0604020104020204" pitchFamily="34" charset="0"/>
+                <a:latin typeface="+mn-lt"/>
                 <a:ea typeface="+mn-ea"/>
                 <a:cs typeface="+mn-cs"/>
               </a:defRPr>
             </a:lvl1pPr>
-            <a:lvl2pPr marL="457200" algn="l" defTabSz="914400" rtl="0" eaLnBrk="1" latinLnBrk="0" hangingPunct="1">
-              <a:defRPr sz="1800" kern="1200">
+            <a:lvl2pPr marL="685800" indent="-228600" algn="l" defTabSz="914400" rtl="0" eaLnBrk="1" latinLnBrk="0" hangingPunct="1">
+              <a:lnSpc>
+                <a:spcPct val="90000"/>
+              </a:lnSpc>
+              <a:spcBef>
+                <a:spcPts val="500"/>
+              </a:spcBef>
+              <a:buFont typeface="Arial" panose="020B0604020202020204" pitchFamily="34" charset="0"/>
+              <a:buChar char="•"/>
+              <a:defRPr sz="1000" kern="1200">
                 <a:solidFill>
-                  <a:schemeClr val="tx1"/>
+                  <a:schemeClr val="bg1"/>
                 </a:solidFill>
                 <a:latin typeface="+mn-lt"/>
                 <a:ea typeface="+mn-ea"/>
                 <a:cs typeface="+mn-cs"/>
               </a:defRPr>
             </a:lvl2pPr>
-            <a:lvl3pPr marL="914400" algn="l" defTabSz="914400" rtl="0" eaLnBrk="1" latinLnBrk="0" hangingPunct="1">
-              <a:defRPr sz="1800" kern="1200">
+            <a:lvl3pPr marL="1143000" indent="-228600" algn="l" defTabSz="914400" rtl="0" eaLnBrk="1" latinLnBrk="0" hangingPunct="1">
+              <a:lnSpc>
+                <a:spcPct val="90000"/>
+              </a:lnSpc>
+              <a:spcBef>
+                <a:spcPts val="500"/>
+              </a:spcBef>
+              <a:buFont typeface="Arial" panose="020B0604020202020204" pitchFamily="34" charset="0"/>
+              <a:buChar char="•"/>
+              <a:defRPr sz="900" kern="1200">
                 <a:solidFill>
-                  <a:schemeClr val="tx1"/>
+                  <a:schemeClr val="bg1"/>
                 </a:solidFill>
                 <a:latin typeface="+mn-lt"/>
                 <a:ea typeface="+mn-ea"/>
                 <a:cs typeface="+mn-cs"/>
               </a:defRPr>
             </a:lvl3pPr>
-            <a:lvl4pPr marL="1371600" algn="l" defTabSz="914400" rtl="0" eaLnBrk="1" latinLnBrk="0" hangingPunct="1">
-              <a:defRPr sz="1800" kern="1200">
+            <a:lvl4pPr marL="1600200" indent="-228600" algn="l" defTabSz="914400" rtl="0" eaLnBrk="1" latinLnBrk="0" hangingPunct="1">
+              <a:lnSpc>
+                <a:spcPct val="90000"/>
+              </a:lnSpc>
+              <a:spcBef>
+                <a:spcPts val="500"/>
+              </a:spcBef>
+              <a:buFont typeface="Arial" panose="020B0604020202020204" pitchFamily="34" charset="0"/>
+              <a:buChar char="•"/>
+              <a:defRPr sz="800" kern="1200">
                 <a:solidFill>
-                  <a:schemeClr val="tx1"/>
+                  <a:schemeClr val="bg1"/>
                 </a:solidFill>
                 <a:latin typeface="+mn-lt"/>
                 <a:ea typeface="+mn-ea"/>
                 <a:cs typeface="+mn-cs"/>
               </a:defRPr>
             </a:lvl4pPr>
-            <a:lvl5pPr marL="1828800" algn="l" defTabSz="914400" rtl="0" eaLnBrk="1" latinLnBrk="0" hangingPunct="1">
-              <a:defRPr sz="1800" kern="1200">
+            <a:lvl5pPr marL="2057400" indent="-228600" algn="l" defTabSz="914400" rtl="0" eaLnBrk="1" latinLnBrk="0" hangingPunct="1">
+              <a:lnSpc>
+                <a:spcPct val="90000"/>
+              </a:lnSpc>
+              <a:spcBef>
+                <a:spcPts val="500"/>
+              </a:spcBef>
+              <a:buFont typeface="Arial" panose="020B0604020202020204" pitchFamily="34" charset="0"/>
+              <a:buChar char="•"/>
+              <a:defRPr sz="800" kern="1200">
                 <a:solidFill>
-                  <a:schemeClr val="tx1"/>
+                  <a:schemeClr val="bg1"/>
                 </a:solidFill>
                 <a:latin typeface="+mn-lt"/>
                 <a:ea typeface="+mn-ea"/>
                 <a:cs typeface="+mn-cs"/>
               </a:defRPr>
             </a:lvl5pPr>
-            <a:lvl6pPr marL="2286000" algn="l" defTabSz="914400" rtl="0" eaLnBrk="1" latinLnBrk="0" hangingPunct="1">
+            <a:lvl6pPr marL="2514600" indent="-228600" algn="l" defTabSz="914400" rtl="0" eaLnBrk="1" latinLnBrk="0" hangingPunct="1">
+              <a:lnSpc>
+                <a:spcPct val="90000"/>
+              </a:lnSpc>
+              <a:spcBef>
+                <a:spcPts val="500"/>
+              </a:spcBef>
+              <a:buFont typeface="Arial" panose="020B0604020202020204" pitchFamily="34" charset="0"/>
+              <a:buChar char="•"/>
               <a:defRPr sz="1800" kern="1200">
                 <a:solidFill>
                   <a:schemeClr val="tx1"/>
@@ -28750,7 +27605,15 @@
                 <a:cs typeface="+mn-cs"/>
               </a:defRPr>
             </a:lvl6pPr>
-            <a:lvl7pPr marL="2743200" algn="l" defTabSz="914400" rtl="0" eaLnBrk="1" latinLnBrk="0" hangingPunct="1">
+            <a:lvl7pPr marL="2971800" indent="-228600" algn="l" defTabSz="914400" rtl="0" eaLnBrk="1" latinLnBrk="0" hangingPunct="1">
+              <a:lnSpc>
+                <a:spcPct val="90000"/>
+              </a:lnSpc>
+              <a:spcBef>
+                <a:spcPts val="500"/>
+              </a:spcBef>
+              <a:buFont typeface="Arial" panose="020B0604020202020204" pitchFamily="34" charset="0"/>
+              <a:buChar char="•"/>
               <a:defRPr sz="1800" kern="1200">
                 <a:solidFill>
                   <a:schemeClr val="tx1"/>
@@ -28760,7 +27623,15 @@
                 <a:cs typeface="+mn-cs"/>
               </a:defRPr>
             </a:lvl7pPr>
-            <a:lvl8pPr marL="3200400" algn="l" defTabSz="914400" rtl="0" eaLnBrk="1" latinLnBrk="0" hangingPunct="1">
+            <a:lvl8pPr marL="3429000" indent="-228600" algn="l" defTabSz="914400" rtl="0" eaLnBrk="1" latinLnBrk="0" hangingPunct="1">
+              <a:lnSpc>
+                <a:spcPct val="90000"/>
+              </a:lnSpc>
+              <a:spcBef>
+                <a:spcPts val="500"/>
+              </a:spcBef>
+              <a:buFont typeface="Arial" panose="020B0604020202020204" pitchFamily="34" charset="0"/>
+              <a:buChar char="•"/>
               <a:defRPr sz="1800" kern="1200">
                 <a:solidFill>
                   <a:schemeClr val="tx1"/>
@@ -28770,7 +27641,15 @@
                 <a:cs typeface="+mn-cs"/>
               </a:defRPr>
             </a:lvl8pPr>
-            <a:lvl9pPr marL="3657600" algn="l" defTabSz="914400" rtl="0" eaLnBrk="1" latinLnBrk="0" hangingPunct="1">
+            <a:lvl9pPr marL="3886200" indent="-228600" algn="l" defTabSz="914400" rtl="0" eaLnBrk="1" latinLnBrk="0" hangingPunct="1">
+              <a:lnSpc>
+                <a:spcPct val="90000"/>
+              </a:lnSpc>
+              <a:spcBef>
+                <a:spcPts val="500"/>
+              </a:spcBef>
+              <a:buFont typeface="Arial" panose="020B0604020202020204" pitchFamily="34" charset="0"/>
+              <a:buChar char="•"/>
               <a:defRPr sz="1800" kern="1200">
                 <a:solidFill>
                   <a:schemeClr val="tx1"/>
@@ -28782,92 +27661,9 @@
             </a:lvl9pPr>
           </a:lstStyle>
           <a:p>
-            <a:pPr marL="0" marR="0" lvl="0" indent="0" algn="ctr" defTabSz="914400" rtl="0" eaLnBrk="1" fontAlgn="auto" latinLnBrk="0" hangingPunct="1">
-              <a:lnSpc>
-                <a:spcPct val="100000"/>
-              </a:lnSpc>
-              <a:spcBef>
-                <a:spcPts val="0"/>
-              </a:spcBef>
-              <a:spcAft>
-                <a:spcPts val="0"/>
-              </a:spcAft>
-              <a:buClrTx/>
-              <a:buSzTx/>
-              <a:buFontTx/>
-              <a:buNone/>
-              <a:tabLst/>
-              <a:defRPr/>
-            </a:pPr>
-            <a:fld id="{47FEACEE-25B4-4A2D-B147-27296E36371D}" type="slidenum">
-              <a:rPr kumimoji="0" lang="zh-CN" altLang="en-US" sz="1200" u="none" strike="noStrike" kern="1200" cap="none" spc="0" normalizeH="0" baseline="0" noProof="0" smtClean="0">
-                <a:ln>
-                  <a:noFill/>
-                </a:ln>
-                <a:solidFill>
-                  <a:schemeClr val="bg1"/>
-                </a:solidFill>
-                <a:effectLst/>
-                <a:uLnTx/>
-                <a:uFillTx/>
-              </a:rPr>
-              <a:pPr marL="0" marR="0" lvl="0" indent="0" algn="ctr" defTabSz="914400" rtl="0" eaLnBrk="1" fontAlgn="auto" latinLnBrk="0" hangingPunct="1">
-                <a:lnSpc>
-                  <a:spcPct val="100000"/>
-                </a:lnSpc>
-                <a:spcBef>
-                  <a:spcPts val="0"/>
-                </a:spcBef>
-                <a:spcAft>
-                  <a:spcPts val="0"/>
-                </a:spcAft>
-                <a:buClrTx/>
-                <a:buSzTx/>
-                <a:buFontTx/>
-                <a:buNone/>
-                <a:tabLst/>
-                <a:defRPr/>
-              </a:pPr>
-              <a:t>3</a:t>
-            </a:fld>
-            <a:endParaRPr kumimoji="0" lang="zh-CN" altLang="en-US" sz="1200" u="none" strike="noStrike" kern="1200" cap="none" spc="0" normalizeH="0" baseline="0" noProof="0" dirty="0">
-              <a:ln>
-                <a:noFill/>
-              </a:ln>
-              <a:solidFill>
-                <a:schemeClr val="bg1"/>
-              </a:solidFill>
-              <a:effectLst/>
-              <a:uLnTx/>
-              <a:uFillTx/>
-            </a:endParaRPr>
-          </a:p>
-        </p:txBody>
-      </p:sp>
-      <p:sp>
-        <p:nvSpPr>
-          <p:cNvPr id="18" name="Footer Placeholder 17">
-            <a:extLst>
-              <a:ext uri="{FF2B5EF4-FFF2-40B4-BE49-F238E27FC236}">
-                <a16:creationId xmlns:a16="http://schemas.microsoft.com/office/drawing/2014/main" id="{59AC624B-4FD9-E308-F182-08902D49A82B}"/>
-              </a:ext>
-            </a:extLst>
-          </p:cNvPr>
-          <p:cNvSpPr>
-            <a:spLocks noGrp="1"/>
-          </p:cNvSpPr>
-          <p:nvPr>
-            <p:ph type="ftr" sz="quarter" idx="52"/>
-          </p:nvPr>
-        </p:nvSpPr>
-        <p:spPr/>
-        <p:txBody>
-          <a:bodyPr/>
-          <a:lstStyle/>
-          <a:p>
             <a:r>
-              <a:rPr lang="en-US" noProof="0" dirty="0"/>
-              <a:t>Cyclistic – Rider Trends</a:t>
+              <a:rPr lang="en-US" dirty="0"/>
+              <a:t>Analyze rider data from the last 12 months to identify trends in usage between member and casual riders.</a:t>
             </a:r>
           </a:p>
         </p:txBody>
@@ -28931,46 +27727,6 @@
             <a:r>
               <a:rPr lang="en-US" sz="4400" dirty="0"/>
               <a:t>Analysis</a:t>
-            </a:r>
-          </a:p>
-        </p:txBody>
-      </p:sp>
-      <p:sp>
-        <p:nvSpPr>
-          <p:cNvPr id="4" name="Footer Placeholder 3">
-            <a:extLst>
-              <a:ext uri="{FF2B5EF4-FFF2-40B4-BE49-F238E27FC236}">
-                <a16:creationId xmlns:a16="http://schemas.microsoft.com/office/drawing/2014/main" id="{5C81FE8F-11E2-1F9A-4831-FB7F1CE16539}"/>
-              </a:ext>
-            </a:extLst>
-          </p:cNvPr>
-          <p:cNvSpPr>
-            <a:spLocks noGrp="1"/>
-          </p:cNvSpPr>
-          <p:nvPr>
-            <p:ph type="ftr" sz="quarter" idx="30"/>
-          </p:nvPr>
-        </p:nvSpPr>
-        <p:spPr>
-          <a:xfrm>
-            <a:off x="484632" y="6217920"/>
-            <a:ext cx="4114800" cy="365125"/>
-          </a:xfrm>
-        </p:spPr>
-        <p:txBody>
-          <a:bodyPr anchor="ctr">
-            <a:normAutofit/>
-          </a:bodyPr>
-          <a:lstStyle/>
-          <a:p>
-            <a:pPr>
-              <a:spcAft>
-                <a:spcPts val="600"/>
-              </a:spcAft>
-            </a:pPr>
-            <a:r>
-              <a:rPr lang="en-US" noProof="0" dirty="0"/>
-              <a:t>Cyclistic – Rider Trends</a:t>
             </a:r>
           </a:p>
         </p:txBody>
@@ -29974,46 +28730,6 @@
           </a:p>
         </p:txBody>
       </p:sp>
-      <p:sp>
-        <p:nvSpPr>
-          <p:cNvPr id="4" name="Footer Placeholder 3">
-            <a:extLst>
-              <a:ext uri="{FF2B5EF4-FFF2-40B4-BE49-F238E27FC236}">
-                <a16:creationId xmlns:a16="http://schemas.microsoft.com/office/drawing/2014/main" id="{66E77084-741D-AEFE-3B58-63662E9541D9}"/>
-              </a:ext>
-            </a:extLst>
-          </p:cNvPr>
-          <p:cNvSpPr>
-            <a:spLocks noGrp="1"/>
-          </p:cNvSpPr>
-          <p:nvPr>
-            <p:ph type="ftr" sz="quarter" idx="46"/>
-          </p:nvPr>
-        </p:nvSpPr>
-        <p:spPr>
-          <a:xfrm>
-            <a:off x="484632" y="6217920"/>
-            <a:ext cx="4114800" cy="365125"/>
-          </a:xfrm>
-        </p:spPr>
-        <p:txBody>
-          <a:bodyPr anchor="ctr">
-            <a:normAutofit/>
-          </a:bodyPr>
-          <a:lstStyle/>
-          <a:p>
-            <a:pPr>
-              <a:spcAft>
-                <a:spcPts val="600"/>
-              </a:spcAft>
-            </a:pPr>
-            <a:r>
-              <a:rPr lang="en-US" noProof="0" dirty="0"/>
-              <a:t>Cyclistic – Rider Trends</a:t>
-            </a:r>
-          </a:p>
-        </p:txBody>
-      </p:sp>
     </p:spTree>
     <p:extLst>
       <p:ext uri="{BB962C8B-B14F-4D97-AF65-F5344CB8AC3E}">
@@ -30068,217 +28784,6 @@
             <a:r>
               <a:rPr lang="en-US" dirty="0"/>
               <a:t>Trend – Number of Rides by Rider Type</a:t>
-            </a:r>
-          </a:p>
-        </p:txBody>
-      </p:sp>
-      <p:sp>
-        <p:nvSpPr>
-          <p:cNvPr id="8" name="Slide Number Placeholder 13">
-            <a:extLst>
-              <a:ext uri="{FF2B5EF4-FFF2-40B4-BE49-F238E27FC236}">
-                <a16:creationId xmlns:a16="http://schemas.microsoft.com/office/drawing/2014/main" id="{CFA8B549-5835-0C7F-9027-5D0D38A50DEB}"/>
-              </a:ext>
-            </a:extLst>
-          </p:cNvPr>
-          <p:cNvSpPr txBox="1">
-            <a:spLocks/>
-          </p:cNvSpPr>
-          <p:nvPr/>
-        </p:nvSpPr>
-        <p:spPr>
-          <a:xfrm>
-            <a:off x="11194169" y="6215665"/>
-            <a:ext cx="458592" cy="365125"/>
-          </a:xfrm>
-          <a:prstGeom prst="rect">
-            <a:avLst/>
-          </a:prstGeom>
-        </p:spPr>
-        <p:txBody>
-          <a:bodyPr anchor="ctr"/>
-          <a:lstStyle>
-            <a:defPPr>
-              <a:defRPr lang="zh-CN"/>
-            </a:defPPr>
-            <a:lvl1pPr marL="0" algn="ctr" defTabSz="914400" rtl="0" eaLnBrk="1" latinLnBrk="0" hangingPunct="1">
-              <a:defRPr sz="1200" b="0" i="0" kern="1200">
-                <a:solidFill>
-                  <a:schemeClr val="tx1"/>
-                </a:solidFill>
-                <a:latin typeface="Abadi" panose="020B0604020104020204" pitchFamily="34" charset="0"/>
-                <a:ea typeface="+mn-ea"/>
-                <a:cs typeface="+mn-cs"/>
-              </a:defRPr>
-            </a:lvl1pPr>
-            <a:lvl2pPr marL="457200" algn="l" defTabSz="914400" rtl="0" eaLnBrk="1" latinLnBrk="0" hangingPunct="1">
-              <a:defRPr sz="1800" kern="1200">
-                <a:solidFill>
-                  <a:schemeClr val="tx1"/>
-                </a:solidFill>
-                <a:latin typeface="+mn-lt"/>
-                <a:ea typeface="+mn-ea"/>
-                <a:cs typeface="+mn-cs"/>
-              </a:defRPr>
-            </a:lvl2pPr>
-            <a:lvl3pPr marL="914400" algn="l" defTabSz="914400" rtl="0" eaLnBrk="1" latinLnBrk="0" hangingPunct="1">
-              <a:defRPr sz="1800" kern="1200">
-                <a:solidFill>
-                  <a:schemeClr val="tx1"/>
-                </a:solidFill>
-                <a:latin typeface="+mn-lt"/>
-                <a:ea typeface="+mn-ea"/>
-                <a:cs typeface="+mn-cs"/>
-              </a:defRPr>
-            </a:lvl3pPr>
-            <a:lvl4pPr marL="1371600" algn="l" defTabSz="914400" rtl="0" eaLnBrk="1" latinLnBrk="0" hangingPunct="1">
-              <a:defRPr sz="1800" kern="1200">
-                <a:solidFill>
-                  <a:schemeClr val="tx1"/>
-                </a:solidFill>
-                <a:latin typeface="+mn-lt"/>
-                <a:ea typeface="+mn-ea"/>
-                <a:cs typeface="+mn-cs"/>
-              </a:defRPr>
-            </a:lvl4pPr>
-            <a:lvl5pPr marL="1828800" algn="l" defTabSz="914400" rtl="0" eaLnBrk="1" latinLnBrk="0" hangingPunct="1">
-              <a:defRPr sz="1800" kern="1200">
-                <a:solidFill>
-                  <a:schemeClr val="tx1"/>
-                </a:solidFill>
-                <a:latin typeface="+mn-lt"/>
-                <a:ea typeface="+mn-ea"/>
-                <a:cs typeface="+mn-cs"/>
-              </a:defRPr>
-            </a:lvl5pPr>
-            <a:lvl6pPr marL="2286000" algn="l" defTabSz="914400" rtl="0" eaLnBrk="1" latinLnBrk="0" hangingPunct="1">
-              <a:defRPr sz="1800" kern="1200">
-                <a:solidFill>
-                  <a:schemeClr val="tx1"/>
-                </a:solidFill>
-                <a:latin typeface="+mn-lt"/>
-                <a:ea typeface="+mn-ea"/>
-                <a:cs typeface="+mn-cs"/>
-              </a:defRPr>
-            </a:lvl6pPr>
-            <a:lvl7pPr marL="2743200" algn="l" defTabSz="914400" rtl="0" eaLnBrk="1" latinLnBrk="0" hangingPunct="1">
-              <a:defRPr sz="1800" kern="1200">
-                <a:solidFill>
-                  <a:schemeClr val="tx1"/>
-                </a:solidFill>
-                <a:latin typeface="+mn-lt"/>
-                <a:ea typeface="+mn-ea"/>
-                <a:cs typeface="+mn-cs"/>
-              </a:defRPr>
-            </a:lvl7pPr>
-            <a:lvl8pPr marL="3200400" algn="l" defTabSz="914400" rtl="0" eaLnBrk="1" latinLnBrk="0" hangingPunct="1">
-              <a:defRPr sz="1800" kern="1200">
-                <a:solidFill>
-                  <a:schemeClr val="tx1"/>
-                </a:solidFill>
-                <a:latin typeface="+mn-lt"/>
-                <a:ea typeface="+mn-ea"/>
-                <a:cs typeface="+mn-cs"/>
-              </a:defRPr>
-            </a:lvl8pPr>
-            <a:lvl9pPr marL="3657600" algn="l" defTabSz="914400" rtl="0" eaLnBrk="1" latinLnBrk="0" hangingPunct="1">
-              <a:defRPr sz="1800" kern="1200">
-                <a:solidFill>
-                  <a:schemeClr val="tx1"/>
-                </a:solidFill>
-                <a:latin typeface="+mn-lt"/>
-                <a:ea typeface="+mn-ea"/>
-                <a:cs typeface="+mn-cs"/>
-              </a:defRPr>
-            </a:lvl9pPr>
-          </a:lstStyle>
-          <a:p>
-            <a:pPr marL="0" marR="0" lvl="0" indent="0" algn="ctr" defTabSz="914400" rtl="0" eaLnBrk="1" fontAlgn="auto" latinLnBrk="0" hangingPunct="1">
-              <a:lnSpc>
-                <a:spcPct val="100000"/>
-              </a:lnSpc>
-              <a:spcBef>
-                <a:spcPts val="0"/>
-              </a:spcBef>
-              <a:spcAft>
-                <a:spcPts val="0"/>
-              </a:spcAft>
-              <a:buClrTx/>
-              <a:buSzTx/>
-              <a:buFontTx/>
-              <a:buNone/>
-              <a:tabLst/>
-              <a:defRPr/>
-            </a:pPr>
-            <a:fld id="{47FEACEE-25B4-4A2D-B147-27296E36371D}" type="slidenum">
-              <a:rPr kumimoji="0" lang="zh-CN" altLang="en-US" sz="1200" u="none" strike="noStrike" kern="1200" cap="none" spc="0" normalizeH="0" baseline="0" noProof="0" smtClean="0">
-                <a:ln>
-                  <a:noFill/>
-                </a:ln>
-                <a:solidFill>
-                  <a:schemeClr val="bg1"/>
-                </a:solidFill>
-                <a:effectLst/>
-                <a:uLnTx/>
-                <a:uFillTx/>
-              </a:rPr>
-              <a:pPr marL="0" marR="0" lvl="0" indent="0" algn="ctr" defTabSz="914400" rtl="0" eaLnBrk="1" fontAlgn="auto" latinLnBrk="0" hangingPunct="1">
-                <a:lnSpc>
-                  <a:spcPct val="100000"/>
-                </a:lnSpc>
-                <a:spcBef>
-                  <a:spcPts val="0"/>
-                </a:spcBef>
-                <a:spcAft>
-                  <a:spcPts val="0"/>
-                </a:spcAft>
-                <a:buClrTx/>
-                <a:buSzTx/>
-                <a:buFontTx/>
-                <a:buNone/>
-                <a:tabLst/>
-                <a:defRPr/>
-              </a:pPr>
-              <a:t>7</a:t>
-            </a:fld>
-            <a:endParaRPr kumimoji="0" lang="zh-CN" altLang="en-US" sz="1200" u="none" strike="noStrike" kern="1200" cap="none" spc="0" normalizeH="0" baseline="0" noProof="0" dirty="0">
-              <a:ln>
-                <a:noFill/>
-              </a:ln>
-              <a:solidFill>
-                <a:schemeClr val="bg1"/>
-              </a:solidFill>
-              <a:effectLst/>
-              <a:uLnTx/>
-              <a:uFillTx/>
-            </a:endParaRPr>
-          </a:p>
-        </p:txBody>
-      </p:sp>
-      <p:sp>
-        <p:nvSpPr>
-          <p:cNvPr id="4" name="Footer Placeholder 3">
-            <a:extLst>
-              <a:ext uri="{FF2B5EF4-FFF2-40B4-BE49-F238E27FC236}">
-                <a16:creationId xmlns:a16="http://schemas.microsoft.com/office/drawing/2014/main" id="{15D16185-55D3-A290-727A-4996BB9F0A9F}"/>
-              </a:ext>
-            </a:extLst>
-          </p:cNvPr>
-          <p:cNvSpPr>
-            <a:spLocks noGrp="1"/>
-          </p:cNvSpPr>
-          <p:nvPr>
-            <p:ph type="ftr" sz="quarter" idx="28"/>
-          </p:nvPr>
-        </p:nvSpPr>
-        <p:spPr/>
-        <p:txBody>
-          <a:bodyPr/>
-          <a:lstStyle/>
-          <a:p>
-            <a:r>
-              <a:rPr lang="en-US" noProof="0" dirty="0"/>
-              <a:t>Cyclistic – Rider Trends</a:t>
             </a:r>
           </a:p>
         </p:txBody>
@@ -30371,217 +28876,6 @@
           </a:p>
         </p:txBody>
       </p:sp>
-      <p:sp>
-        <p:nvSpPr>
-          <p:cNvPr id="8" name="Slide Number Placeholder 13">
-            <a:extLst>
-              <a:ext uri="{FF2B5EF4-FFF2-40B4-BE49-F238E27FC236}">
-                <a16:creationId xmlns:a16="http://schemas.microsoft.com/office/drawing/2014/main" id="{CFA8B549-5835-0C7F-9027-5D0D38A50DEB}"/>
-              </a:ext>
-            </a:extLst>
-          </p:cNvPr>
-          <p:cNvSpPr txBox="1">
-            <a:spLocks/>
-          </p:cNvSpPr>
-          <p:nvPr/>
-        </p:nvSpPr>
-        <p:spPr>
-          <a:xfrm>
-            <a:off x="11194169" y="6215665"/>
-            <a:ext cx="458592" cy="365125"/>
-          </a:xfrm>
-          <a:prstGeom prst="rect">
-            <a:avLst/>
-          </a:prstGeom>
-        </p:spPr>
-        <p:txBody>
-          <a:bodyPr anchor="ctr"/>
-          <a:lstStyle>
-            <a:defPPr>
-              <a:defRPr lang="zh-CN"/>
-            </a:defPPr>
-            <a:lvl1pPr marL="0" algn="ctr" defTabSz="914400" rtl="0" eaLnBrk="1" latinLnBrk="0" hangingPunct="1">
-              <a:defRPr sz="1200" b="0" i="0" kern="1200">
-                <a:solidFill>
-                  <a:schemeClr val="tx1"/>
-                </a:solidFill>
-                <a:latin typeface="Abadi" panose="020B0604020104020204" pitchFamily="34" charset="0"/>
-                <a:ea typeface="+mn-ea"/>
-                <a:cs typeface="+mn-cs"/>
-              </a:defRPr>
-            </a:lvl1pPr>
-            <a:lvl2pPr marL="457200" algn="l" defTabSz="914400" rtl="0" eaLnBrk="1" latinLnBrk="0" hangingPunct="1">
-              <a:defRPr sz="1800" kern="1200">
-                <a:solidFill>
-                  <a:schemeClr val="tx1"/>
-                </a:solidFill>
-                <a:latin typeface="+mn-lt"/>
-                <a:ea typeface="+mn-ea"/>
-                <a:cs typeface="+mn-cs"/>
-              </a:defRPr>
-            </a:lvl2pPr>
-            <a:lvl3pPr marL="914400" algn="l" defTabSz="914400" rtl="0" eaLnBrk="1" latinLnBrk="0" hangingPunct="1">
-              <a:defRPr sz="1800" kern="1200">
-                <a:solidFill>
-                  <a:schemeClr val="tx1"/>
-                </a:solidFill>
-                <a:latin typeface="+mn-lt"/>
-                <a:ea typeface="+mn-ea"/>
-                <a:cs typeface="+mn-cs"/>
-              </a:defRPr>
-            </a:lvl3pPr>
-            <a:lvl4pPr marL="1371600" algn="l" defTabSz="914400" rtl="0" eaLnBrk="1" latinLnBrk="0" hangingPunct="1">
-              <a:defRPr sz="1800" kern="1200">
-                <a:solidFill>
-                  <a:schemeClr val="tx1"/>
-                </a:solidFill>
-                <a:latin typeface="+mn-lt"/>
-                <a:ea typeface="+mn-ea"/>
-                <a:cs typeface="+mn-cs"/>
-              </a:defRPr>
-            </a:lvl4pPr>
-            <a:lvl5pPr marL="1828800" algn="l" defTabSz="914400" rtl="0" eaLnBrk="1" latinLnBrk="0" hangingPunct="1">
-              <a:defRPr sz="1800" kern="1200">
-                <a:solidFill>
-                  <a:schemeClr val="tx1"/>
-                </a:solidFill>
-                <a:latin typeface="+mn-lt"/>
-                <a:ea typeface="+mn-ea"/>
-                <a:cs typeface="+mn-cs"/>
-              </a:defRPr>
-            </a:lvl5pPr>
-            <a:lvl6pPr marL="2286000" algn="l" defTabSz="914400" rtl="0" eaLnBrk="1" latinLnBrk="0" hangingPunct="1">
-              <a:defRPr sz="1800" kern="1200">
-                <a:solidFill>
-                  <a:schemeClr val="tx1"/>
-                </a:solidFill>
-                <a:latin typeface="+mn-lt"/>
-                <a:ea typeface="+mn-ea"/>
-                <a:cs typeface="+mn-cs"/>
-              </a:defRPr>
-            </a:lvl6pPr>
-            <a:lvl7pPr marL="2743200" algn="l" defTabSz="914400" rtl="0" eaLnBrk="1" latinLnBrk="0" hangingPunct="1">
-              <a:defRPr sz="1800" kern="1200">
-                <a:solidFill>
-                  <a:schemeClr val="tx1"/>
-                </a:solidFill>
-                <a:latin typeface="+mn-lt"/>
-                <a:ea typeface="+mn-ea"/>
-                <a:cs typeface="+mn-cs"/>
-              </a:defRPr>
-            </a:lvl7pPr>
-            <a:lvl8pPr marL="3200400" algn="l" defTabSz="914400" rtl="0" eaLnBrk="1" latinLnBrk="0" hangingPunct="1">
-              <a:defRPr sz="1800" kern="1200">
-                <a:solidFill>
-                  <a:schemeClr val="tx1"/>
-                </a:solidFill>
-                <a:latin typeface="+mn-lt"/>
-                <a:ea typeface="+mn-ea"/>
-                <a:cs typeface="+mn-cs"/>
-              </a:defRPr>
-            </a:lvl8pPr>
-            <a:lvl9pPr marL="3657600" algn="l" defTabSz="914400" rtl="0" eaLnBrk="1" latinLnBrk="0" hangingPunct="1">
-              <a:defRPr sz="1800" kern="1200">
-                <a:solidFill>
-                  <a:schemeClr val="tx1"/>
-                </a:solidFill>
-                <a:latin typeface="+mn-lt"/>
-                <a:ea typeface="+mn-ea"/>
-                <a:cs typeface="+mn-cs"/>
-              </a:defRPr>
-            </a:lvl9pPr>
-          </a:lstStyle>
-          <a:p>
-            <a:pPr marL="0" marR="0" lvl="0" indent="0" algn="ctr" defTabSz="914400" rtl="0" eaLnBrk="1" fontAlgn="auto" latinLnBrk="0" hangingPunct="1">
-              <a:lnSpc>
-                <a:spcPct val="100000"/>
-              </a:lnSpc>
-              <a:spcBef>
-                <a:spcPts val="0"/>
-              </a:spcBef>
-              <a:spcAft>
-                <a:spcPts val="0"/>
-              </a:spcAft>
-              <a:buClrTx/>
-              <a:buSzTx/>
-              <a:buFontTx/>
-              <a:buNone/>
-              <a:tabLst/>
-              <a:defRPr/>
-            </a:pPr>
-            <a:fld id="{47FEACEE-25B4-4A2D-B147-27296E36371D}" type="slidenum">
-              <a:rPr kumimoji="0" lang="zh-CN" altLang="en-US" sz="1200" u="none" strike="noStrike" kern="1200" cap="none" spc="0" normalizeH="0" baseline="0" noProof="0" smtClean="0">
-                <a:ln>
-                  <a:noFill/>
-                </a:ln>
-                <a:solidFill>
-                  <a:schemeClr val="bg1"/>
-                </a:solidFill>
-                <a:effectLst/>
-                <a:uLnTx/>
-                <a:uFillTx/>
-              </a:rPr>
-              <a:pPr marL="0" marR="0" lvl="0" indent="0" algn="ctr" defTabSz="914400" rtl="0" eaLnBrk="1" fontAlgn="auto" latinLnBrk="0" hangingPunct="1">
-                <a:lnSpc>
-                  <a:spcPct val="100000"/>
-                </a:lnSpc>
-                <a:spcBef>
-                  <a:spcPts val="0"/>
-                </a:spcBef>
-                <a:spcAft>
-                  <a:spcPts val="0"/>
-                </a:spcAft>
-                <a:buClrTx/>
-                <a:buSzTx/>
-                <a:buFontTx/>
-                <a:buNone/>
-                <a:tabLst/>
-                <a:defRPr/>
-              </a:pPr>
-              <a:t>8</a:t>
-            </a:fld>
-            <a:endParaRPr kumimoji="0" lang="zh-CN" altLang="en-US" sz="1200" u="none" strike="noStrike" kern="1200" cap="none" spc="0" normalizeH="0" baseline="0" noProof="0" dirty="0">
-              <a:ln>
-                <a:noFill/>
-              </a:ln>
-              <a:solidFill>
-                <a:schemeClr val="bg1"/>
-              </a:solidFill>
-              <a:effectLst/>
-              <a:uLnTx/>
-              <a:uFillTx/>
-            </a:endParaRPr>
-          </a:p>
-        </p:txBody>
-      </p:sp>
-      <p:sp>
-        <p:nvSpPr>
-          <p:cNvPr id="4" name="Footer Placeholder 3">
-            <a:extLst>
-              <a:ext uri="{FF2B5EF4-FFF2-40B4-BE49-F238E27FC236}">
-                <a16:creationId xmlns:a16="http://schemas.microsoft.com/office/drawing/2014/main" id="{15D16185-55D3-A290-727A-4996BB9F0A9F}"/>
-              </a:ext>
-            </a:extLst>
-          </p:cNvPr>
-          <p:cNvSpPr>
-            <a:spLocks noGrp="1"/>
-          </p:cNvSpPr>
-          <p:nvPr>
-            <p:ph type="ftr" sz="quarter" idx="28"/>
-          </p:nvPr>
-        </p:nvSpPr>
-        <p:spPr/>
-        <p:txBody>
-          <a:bodyPr/>
-          <a:lstStyle/>
-          <a:p>
-            <a:r>
-              <a:rPr lang="en-US" noProof="0" dirty="0"/>
-              <a:t>Cyclistic – Rider Trends</a:t>
-            </a:r>
-          </a:p>
-        </p:txBody>
-      </p:sp>
       <p:pic>
         <p:nvPicPr>
           <p:cNvPr id="6" name="Picture 5" descr="Chart, line chart&#10;&#10;Description automatically generated">
@@ -30666,217 +28960,6 @@
             <a:r>
               <a:rPr lang="en-US" dirty="0"/>
               <a:t>Weekday Differences</a:t>
-            </a:r>
-          </a:p>
-        </p:txBody>
-      </p:sp>
-      <p:sp>
-        <p:nvSpPr>
-          <p:cNvPr id="8" name="Slide Number Placeholder 13">
-            <a:extLst>
-              <a:ext uri="{FF2B5EF4-FFF2-40B4-BE49-F238E27FC236}">
-                <a16:creationId xmlns:a16="http://schemas.microsoft.com/office/drawing/2014/main" id="{CFA8B549-5835-0C7F-9027-5D0D38A50DEB}"/>
-              </a:ext>
-            </a:extLst>
-          </p:cNvPr>
-          <p:cNvSpPr txBox="1">
-            <a:spLocks/>
-          </p:cNvSpPr>
-          <p:nvPr/>
-        </p:nvSpPr>
-        <p:spPr>
-          <a:xfrm>
-            <a:off x="11194169" y="6215665"/>
-            <a:ext cx="458592" cy="365125"/>
-          </a:xfrm>
-          <a:prstGeom prst="rect">
-            <a:avLst/>
-          </a:prstGeom>
-        </p:spPr>
-        <p:txBody>
-          <a:bodyPr anchor="ctr"/>
-          <a:lstStyle>
-            <a:defPPr>
-              <a:defRPr lang="zh-CN"/>
-            </a:defPPr>
-            <a:lvl1pPr marL="0" algn="ctr" defTabSz="914400" rtl="0" eaLnBrk="1" latinLnBrk="0" hangingPunct="1">
-              <a:defRPr sz="1200" b="0" i="0" kern="1200">
-                <a:solidFill>
-                  <a:schemeClr val="tx1"/>
-                </a:solidFill>
-                <a:latin typeface="Abadi" panose="020B0604020104020204" pitchFamily="34" charset="0"/>
-                <a:ea typeface="+mn-ea"/>
-                <a:cs typeface="+mn-cs"/>
-              </a:defRPr>
-            </a:lvl1pPr>
-            <a:lvl2pPr marL="457200" algn="l" defTabSz="914400" rtl="0" eaLnBrk="1" latinLnBrk="0" hangingPunct="1">
-              <a:defRPr sz="1800" kern="1200">
-                <a:solidFill>
-                  <a:schemeClr val="tx1"/>
-                </a:solidFill>
-                <a:latin typeface="+mn-lt"/>
-                <a:ea typeface="+mn-ea"/>
-                <a:cs typeface="+mn-cs"/>
-              </a:defRPr>
-            </a:lvl2pPr>
-            <a:lvl3pPr marL="914400" algn="l" defTabSz="914400" rtl="0" eaLnBrk="1" latinLnBrk="0" hangingPunct="1">
-              <a:defRPr sz="1800" kern="1200">
-                <a:solidFill>
-                  <a:schemeClr val="tx1"/>
-                </a:solidFill>
-                <a:latin typeface="+mn-lt"/>
-                <a:ea typeface="+mn-ea"/>
-                <a:cs typeface="+mn-cs"/>
-              </a:defRPr>
-            </a:lvl3pPr>
-            <a:lvl4pPr marL="1371600" algn="l" defTabSz="914400" rtl="0" eaLnBrk="1" latinLnBrk="0" hangingPunct="1">
-              <a:defRPr sz="1800" kern="1200">
-                <a:solidFill>
-                  <a:schemeClr val="tx1"/>
-                </a:solidFill>
-                <a:latin typeface="+mn-lt"/>
-                <a:ea typeface="+mn-ea"/>
-                <a:cs typeface="+mn-cs"/>
-              </a:defRPr>
-            </a:lvl4pPr>
-            <a:lvl5pPr marL="1828800" algn="l" defTabSz="914400" rtl="0" eaLnBrk="1" latinLnBrk="0" hangingPunct="1">
-              <a:defRPr sz="1800" kern="1200">
-                <a:solidFill>
-                  <a:schemeClr val="tx1"/>
-                </a:solidFill>
-                <a:latin typeface="+mn-lt"/>
-                <a:ea typeface="+mn-ea"/>
-                <a:cs typeface="+mn-cs"/>
-              </a:defRPr>
-            </a:lvl5pPr>
-            <a:lvl6pPr marL="2286000" algn="l" defTabSz="914400" rtl="0" eaLnBrk="1" latinLnBrk="0" hangingPunct="1">
-              <a:defRPr sz="1800" kern="1200">
-                <a:solidFill>
-                  <a:schemeClr val="tx1"/>
-                </a:solidFill>
-                <a:latin typeface="+mn-lt"/>
-                <a:ea typeface="+mn-ea"/>
-                <a:cs typeface="+mn-cs"/>
-              </a:defRPr>
-            </a:lvl6pPr>
-            <a:lvl7pPr marL="2743200" algn="l" defTabSz="914400" rtl="0" eaLnBrk="1" latinLnBrk="0" hangingPunct="1">
-              <a:defRPr sz="1800" kern="1200">
-                <a:solidFill>
-                  <a:schemeClr val="tx1"/>
-                </a:solidFill>
-                <a:latin typeface="+mn-lt"/>
-                <a:ea typeface="+mn-ea"/>
-                <a:cs typeface="+mn-cs"/>
-              </a:defRPr>
-            </a:lvl7pPr>
-            <a:lvl8pPr marL="3200400" algn="l" defTabSz="914400" rtl="0" eaLnBrk="1" latinLnBrk="0" hangingPunct="1">
-              <a:defRPr sz="1800" kern="1200">
-                <a:solidFill>
-                  <a:schemeClr val="tx1"/>
-                </a:solidFill>
-                <a:latin typeface="+mn-lt"/>
-                <a:ea typeface="+mn-ea"/>
-                <a:cs typeface="+mn-cs"/>
-              </a:defRPr>
-            </a:lvl8pPr>
-            <a:lvl9pPr marL="3657600" algn="l" defTabSz="914400" rtl="0" eaLnBrk="1" latinLnBrk="0" hangingPunct="1">
-              <a:defRPr sz="1800" kern="1200">
-                <a:solidFill>
-                  <a:schemeClr val="tx1"/>
-                </a:solidFill>
-                <a:latin typeface="+mn-lt"/>
-                <a:ea typeface="+mn-ea"/>
-                <a:cs typeface="+mn-cs"/>
-              </a:defRPr>
-            </a:lvl9pPr>
-          </a:lstStyle>
-          <a:p>
-            <a:pPr marL="0" marR="0" lvl="0" indent="0" algn="ctr" defTabSz="914400" rtl="0" eaLnBrk="1" fontAlgn="auto" latinLnBrk="0" hangingPunct="1">
-              <a:lnSpc>
-                <a:spcPct val="100000"/>
-              </a:lnSpc>
-              <a:spcBef>
-                <a:spcPts val="0"/>
-              </a:spcBef>
-              <a:spcAft>
-                <a:spcPts val="0"/>
-              </a:spcAft>
-              <a:buClrTx/>
-              <a:buSzTx/>
-              <a:buFontTx/>
-              <a:buNone/>
-              <a:tabLst/>
-              <a:defRPr/>
-            </a:pPr>
-            <a:fld id="{47FEACEE-25B4-4A2D-B147-27296E36371D}" type="slidenum">
-              <a:rPr kumimoji="0" lang="zh-CN" altLang="en-US" sz="1200" u="none" strike="noStrike" kern="1200" cap="none" spc="0" normalizeH="0" baseline="0" noProof="0" smtClean="0">
-                <a:ln>
-                  <a:noFill/>
-                </a:ln>
-                <a:solidFill>
-                  <a:schemeClr val="bg1"/>
-                </a:solidFill>
-                <a:effectLst/>
-                <a:uLnTx/>
-                <a:uFillTx/>
-              </a:rPr>
-              <a:pPr marL="0" marR="0" lvl="0" indent="0" algn="ctr" defTabSz="914400" rtl="0" eaLnBrk="1" fontAlgn="auto" latinLnBrk="0" hangingPunct="1">
-                <a:lnSpc>
-                  <a:spcPct val="100000"/>
-                </a:lnSpc>
-                <a:spcBef>
-                  <a:spcPts val="0"/>
-                </a:spcBef>
-                <a:spcAft>
-                  <a:spcPts val="0"/>
-                </a:spcAft>
-                <a:buClrTx/>
-                <a:buSzTx/>
-                <a:buFontTx/>
-                <a:buNone/>
-                <a:tabLst/>
-                <a:defRPr/>
-              </a:pPr>
-              <a:t>9</a:t>
-            </a:fld>
-            <a:endParaRPr kumimoji="0" lang="zh-CN" altLang="en-US" sz="1200" u="none" strike="noStrike" kern="1200" cap="none" spc="0" normalizeH="0" baseline="0" noProof="0" dirty="0">
-              <a:ln>
-                <a:noFill/>
-              </a:ln>
-              <a:solidFill>
-                <a:schemeClr val="bg1"/>
-              </a:solidFill>
-              <a:effectLst/>
-              <a:uLnTx/>
-              <a:uFillTx/>
-            </a:endParaRPr>
-          </a:p>
-        </p:txBody>
-      </p:sp>
-      <p:sp>
-        <p:nvSpPr>
-          <p:cNvPr id="4" name="Footer Placeholder 3">
-            <a:extLst>
-              <a:ext uri="{FF2B5EF4-FFF2-40B4-BE49-F238E27FC236}">
-                <a16:creationId xmlns:a16="http://schemas.microsoft.com/office/drawing/2014/main" id="{15D16185-55D3-A290-727A-4996BB9F0A9F}"/>
-              </a:ext>
-            </a:extLst>
-          </p:cNvPr>
-          <p:cNvSpPr>
-            <a:spLocks noGrp="1"/>
-          </p:cNvSpPr>
-          <p:nvPr>
-            <p:ph type="ftr" sz="quarter" idx="28"/>
-          </p:nvPr>
-        </p:nvSpPr>
-        <p:spPr/>
-        <p:txBody>
-          <a:bodyPr/>
-          <a:lstStyle/>
-          <a:p>
-            <a:r>
-              <a:rPr lang="en-US" noProof="0" dirty="0"/>
-              <a:t>Cyclistic – Rider Trends</a:t>
             </a:r>
           </a:p>
         </p:txBody>
@@ -31769,6 +29852,15 @@
 </file>
 
 <file path=customXml/item1.xml><?xml version="1.0" encoding="utf-8"?>
+<?mso-contentType ?>
+<FormTemplates xmlns="http://schemas.microsoft.com/sharepoint/v3/contenttype/forms">
+  <Display>DocumentLibraryForm</Display>
+  <Edit>DocumentLibraryForm</Edit>
+  <New>DocumentLibraryForm</New>
+</FormTemplates>
+</file>
+
+<file path=customXml/item2.xml><?xml version="1.0" encoding="utf-8"?>
 <p:properties xmlns:p="http://schemas.microsoft.com/office/2006/metadata/properties" xmlns:xsi="http://www.w3.org/2001/XMLSchema-instance" xmlns:pc="http://schemas.microsoft.com/office/infopath/2007/PartnerControls">
   <documentManagement>
     <_ip_UnifiedCompliancePolicyUIAction xmlns="http://schemas.microsoft.com/sharepoint/v3" xsi:nil="true"/>
@@ -31786,15 +29878,6 @@
     <MediaServiceKeyPoints xmlns="71af3243-3dd4-4a8d-8c0d-dd76da1f02a5" xsi:nil="true"/>
   </documentManagement>
 </p:properties>
-</file>
-
-<file path=customXml/item2.xml><?xml version="1.0" encoding="utf-8"?>
-<?mso-contentType ?>
-<FormTemplates xmlns="http://schemas.microsoft.com/sharepoint/v3/contenttype/forms">
-  <Display>DocumentLibraryForm</Display>
-  <Edit>DocumentLibraryForm</Edit>
-  <New>DocumentLibraryForm</New>
-</FormTemplates>
 </file>
 
 <file path=customXml/item3.xml><?xml version="1.0" encoding="utf-8"?>
@@ -32086,28 +30169,28 @@
 </file>
 
 <file path=customXml/itemProps1.xml><?xml version="1.0" encoding="utf-8"?>
-<ds:datastoreItem xmlns:ds="http://schemas.openxmlformats.org/officeDocument/2006/customXml" ds:itemID="{13A2AE28-B20A-43BD-B938-8C55A179243B}">
+<ds:datastoreItem xmlns:ds="http://schemas.openxmlformats.org/officeDocument/2006/customXml" ds:itemID="{D19EC099-CA80-4E7D-B4BF-2970B26F4E55}">
   <ds:schemaRefs>
-    <ds:schemaRef ds:uri="http://purl.org/dc/elements/1.1/"/>
-    <ds:schemaRef ds:uri="http://purl.org/dc/terms/"/>
-    <ds:schemaRef ds:uri="http://purl.org/dc/dcmitype/"/>
-    <ds:schemaRef ds:uri="230e9df3-be65-4c73-a93b-d1236ebd677e"/>
-    <ds:schemaRef ds:uri="http://schemas.microsoft.com/office/2006/documentManagement/types"/>
-    <ds:schemaRef ds:uri="http://schemas.openxmlformats.org/package/2006/metadata/core-properties"/>
-    <ds:schemaRef ds:uri="http://schemas.microsoft.com/office/infopath/2007/PartnerControls"/>
-    <ds:schemaRef ds:uri="http://schemas.microsoft.com/office/2006/metadata/properties"/>
-    <ds:schemaRef ds:uri="16c05727-aa75-4e4a-9b5f-8a80a1165891"/>
-    <ds:schemaRef ds:uri="71af3243-3dd4-4a8d-8c0d-dd76da1f02a5"/>
-    <ds:schemaRef ds:uri="http://schemas.microsoft.com/sharepoint/v3"/>
-    <ds:schemaRef ds:uri="http://www.w3.org/XML/1998/namespace"/>
+    <ds:schemaRef ds:uri="http://schemas.microsoft.com/sharepoint/v3/contenttype/forms"/>
   </ds:schemaRefs>
 </ds:datastoreItem>
 </file>
 
 <file path=customXml/itemProps2.xml><?xml version="1.0" encoding="utf-8"?>
-<ds:datastoreItem xmlns:ds="http://schemas.openxmlformats.org/officeDocument/2006/customXml" ds:itemID="{D19EC099-CA80-4E7D-B4BF-2970B26F4E55}">
+<ds:datastoreItem xmlns:ds="http://schemas.openxmlformats.org/officeDocument/2006/customXml" ds:itemID="{13A2AE28-B20A-43BD-B938-8C55A179243B}">
   <ds:schemaRefs>
-    <ds:schemaRef ds:uri="http://schemas.microsoft.com/sharepoint/v3/contenttype/forms"/>
+    <ds:schemaRef ds:uri="http://purl.org/dc/elements/1.1/"/>
+    <ds:schemaRef ds:uri="http://purl.org/dc/terms/"/>
+    <ds:schemaRef ds:uri="230e9df3-be65-4c73-a93b-d1236ebd677e"/>
+    <ds:schemaRef ds:uri="71af3243-3dd4-4a8d-8c0d-dd76da1f02a5"/>
+    <ds:schemaRef ds:uri="http://schemas.microsoft.com/office/2006/documentManagement/types"/>
+    <ds:schemaRef ds:uri="http://schemas.microsoft.com/office/infopath/2007/PartnerControls"/>
+    <ds:schemaRef ds:uri="http://schemas.microsoft.com/office/2006/metadata/properties"/>
+    <ds:schemaRef ds:uri="http://schemas.openxmlformats.org/package/2006/metadata/core-properties"/>
+    <ds:schemaRef ds:uri="16c05727-aa75-4e4a-9b5f-8a80a1165891"/>
+    <ds:schemaRef ds:uri="http://schemas.microsoft.com/sharepoint/v3"/>
+    <ds:schemaRef ds:uri="http://www.w3.org/XML/1998/namespace"/>
+    <ds:schemaRef ds:uri="http://purl.org/dc/dcmitype/"/>
   </ds:schemaRefs>
 </ds:datastoreItem>
 </file>

</xml_diff>